<commit_message>
upgrade to .net 8 long time support
</commit_message>
<xml_diff>
--- a/Blazor in .net 8.pptx
+++ b/Blazor in .net 8.pptx
@@ -18,17 +18,18 @@
     <p:sldId id="265" r:id="rId12"/>
     <p:sldId id="263" r:id="rId13"/>
     <p:sldId id="277" r:id="rId14"/>
-    <p:sldId id="279" r:id="rId15"/>
-    <p:sldId id="282" r:id="rId16"/>
-    <p:sldId id="294" r:id="rId17"/>
-    <p:sldId id="288" r:id="rId18"/>
-    <p:sldId id="289" r:id="rId19"/>
-    <p:sldId id="278" r:id="rId20"/>
-    <p:sldId id="287" r:id="rId21"/>
-    <p:sldId id="290" r:id="rId22"/>
-    <p:sldId id="291" r:id="rId23"/>
-    <p:sldId id="293" r:id="rId24"/>
-    <p:sldId id="295" r:id="rId25"/>
+    <p:sldId id="296" r:id="rId15"/>
+    <p:sldId id="279" r:id="rId16"/>
+    <p:sldId id="282" r:id="rId17"/>
+    <p:sldId id="294" r:id="rId18"/>
+    <p:sldId id="288" r:id="rId19"/>
+    <p:sldId id="289" r:id="rId20"/>
+    <p:sldId id="278" r:id="rId21"/>
+    <p:sldId id="287" r:id="rId22"/>
+    <p:sldId id="290" r:id="rId23"/>
+    <p:sldId id="291" r:id="rId24"/>
+    <p:sldId id="293" r:id="rId25"/>
+    <p:sldId id="295" r:id="rId26"/>
   </p:sldIdLst>
   <p:sldSz cx="12192000" cy="6858000"/>
   <p:notesSz cx="6858000" cy="9144000"/>
@@ -1801,7 +1802,7 @@
           <a:p>
             <a:fld id="{8F72BA41-EC5B-4197-BCC8-0FD2E523CD7A}" type="datetimeFigureOut">
               <a:rPr lang="en-US" smtClean="0"/>
-              <a:t>11/16/2023</a:t>
+              <a:t>11/17/2023</a:t>
             </a:fld>
             <a:endParaRPr lang="en-US"/>
           </a:p>
@@ -2004,7 +2005,7 @@
           <a:p>
             <a:fld id="{8F72BA41-EC5B-4197-BCC8-0FD2E523CD7A}" type="datetimeFigureOut">
               <a:rPr lang="en-US" smtClean="0"/>
-              <a:t>11/16/2023</a:t>
+              <a:t>11/17/2023</a:t>
             </a:fld>
             <a:endParaRPr lang="en-US"/>
           </a:p>
@@ -3725,7 +3726,7 @@
           <a:p>
             <a:fld id="{8F72BA41-EC5B-4197-BCC8-0FD2E523CD7A}" type="datetimeFigureOut">
               <a:rPr lang="en-US" smtClean="0"/>
-              <a:t>11/16/2023</a:t>
+              <a:t>11/17/2023</a:t>
             </a:fld>
             <a:endParaRPr lang="en-US"/>
           </a:p>
@@ -3924,7 +3925,7 @@
           <a:p>
             <a:fld id="{8F72BA41-EC5B-4197-BCC8-0FD2E523CD7A}" type="datetimeFigureOut">
               <a:rPr lang="en-US" smtClean="0"/>
-              <a:t>11/16/2023</a:t>
+              <a:t>11/17/2023</a:t>
             </a:fld>
             <a:endParaRPr lang="en-US"/>
           </a:p>
@@ -5714,7 +5715,7 @@
           <a:p>
             <a:fld id="{8F72BA41-EC5B-4197-BCC8-0FD2E523CD7A}" type="datetimeFigureOut">
               <a:rPr lang="en-US" smtClean="0"/>
-              <a:t>11/16/2023</a:t>
+              <a:t>11/17/2023</a:t>
             </a:fld>
             <a:endParaRPr lang="en-US"/>
           </a:p>
@@ -5987,7 +5988,7 @@
           <a:p>
             <a:fld id="{8F72BA41-EC5B-4197-BCC8-0FD2E523CD7A}" type="datetimeFigureOut">
               <a:rPr lang="en-US" smtClean="0"/>
-              <a:t>11/16/2023</a:t>
+              <a:t>11/17/2023</a:t>
             </a:fld>
             <a:endParaRPr lang="en-US"/>
           </a:p>
@@ -6407,7 +6408,7 @@
           <a:p>
             <a:fld id="{8F72BA41-EC5B-4197-BCC8-0FD2E523CD7A}" type="datetimeFigureOut">
               <a:rPr lang="en-US" smtClean="0"/>
-              <a:t>11/16/2023</a:t>
+              <a:t>11/17/2023</a:t>
             </a:fld>
             <a:endParaRPr lang="en-US"/>
           </a:p>
@@ -6563,7 +6564,7 @@
           <a:p>
             <a:fld id="{8F72BA41-EC5B-4197-BCC8-0FD2E523CD7A}" type="datetimeFigureOut">
               <a:rPr lang="en-US" smtClean="0"/>
-              <a:t>11/16/2023</a:t>
+              <a:t>11/17/2023</a:t>
             </a:fld>
             <a:endParaRPr lang="en-US"/>
           </a:p>
@@ -8131,7 +8132,7 @@
           <a:p>
             <a:fld id="{8F72BA41-EC5B-4197-BCC8-0FD2E523CD7A}" type="datetimeFigureOut">
               <a:rPr lang="en-US" smtClean="0"/>
-              <a:t>11/16/2023</a:t>
+              <a:t>11/17/2023</a:t>
             </a:fld>
             <a:endParaRPr lang="en-US"/>
           </a:p>
@@ -9982,7 +9983,7 @@
           <a:p>
             <a:fld id="{8F72BA41-EC5B-4197-BCC8-0FD2E523CD7A}" type="datetimeFigureOut">
               <a:rPr lang="en-US" smtClean="0"/>
-              <a:t>11/16/2023</a:t>
+              <a:t>11/17/2023</a:t>
             </a:fld>
             <a:endParaRPr lang="en-US"/>
           </a:p>
@@ -11795,7 +11796,7 @@
           <a:p>
             <a:fld id="{8F72BA41-EC5B-4197-BCC8-0FD2E523CD7A}" type="datetimeFigureOut">
               <a:rPr lang="en-US" smtClean="0"/>
-              <a:t>11/16/2023</a:t>
+              <a:t>11/17/2023</a:t>
             </a:fld>
             <a:endParaRPr lang="en-US"/>
           </a:p>
@@ -13489,7 +13490,7 @@
             <a:fld id="{8F72BA41-EC5B-4197-BCC8-0FD2E523CD7A}" type="datetimeFigureOut">
               <a:rPr lang="en-US" smtClean="0"/>
               <a:pPr/>
-              <a:t>11/16/2023</a:t>
+              <a:t>11/17/2023</a:t>
             </a:fld>
             <a:endParaRPr lang="en-US" dirty="0"/>
           </a:p>
@@ -17534,7 +17535,7 @@
         <p:spPr>
           <a:xfrm>
             <a:off x="691078" y="2877908"/>
-            <a:ext cx="10324999" cy="1560927"/>
+            <a:ext cx="10324999" cy="1072655"/>
           </a:xfrm>
         </p:spPr>
         <p:txBody>
@@ -17589,56 +17590,6 @@
           </a:p>
           <a:p>
             <a:r>
-              <a:rPr lang="en-US" altLang="zh-CN" sz="1200" dirty="0"/>
-              <a:t>Set </a:t>
-            </a:r>
-            <a:r>
-              <a:rPr lang="en-SG" sz="1200" b="1" dirty="0"/>
-              <a:t>@attribute [</a:t>
-            </a:r>
-            <a:r>
-              <a:rPr lang="en-SG" sz="1200" b="1" dirty="0" err="1"/>
-              <a:t>RenderModeInteractiveWebAssembly</a:t>
-            </a:r>
-            <a:r>
-              <a:rPr lang="en-SG" sz="1200" b="1" dirty="0"/>
-              <a:t>(prerender: false)]/@attribute [</a:t>
-            </a:r>
-            <a:r>
-              <a:rPr lang="en-SG" sz="1200" b="1" dirty="0" err="1"/>
-              <a:t>RenderModeInteractiveServer</a:t>
-            </a:r>
-            <a:r>
-              <a:rPr lang="en-SG" sz="1200" b="1" dirty="0"/>
-              <a:t>(prerender: false)] </a:t>
-            </a:r>
-            <a:r>
-              <a:rPr lang="en-US" altLang="zh-CN" sz="1200" b="1" dirty="0"/>
-              <a:t>/</a:t>
-            </a:r>
-            <a:r>
-              <a:rPr lang="en-US" altLang="zh-CN" sz="1200" dirty="0"/>
-              <a:t> </a:t>
-            </a:r>
-            <a:r>
-              <a:rPr lang="en-SG" sz="1200" b="1" dirty="0"/>
-              <a:t>@attribute [</a:t>
-            </a:r>
-            <a:r>
-              <a:rPr lang="en-SG" sz="1200" b="1" dirty="0" err="1"/>
-              <a:t>RenderModeInteractiveAuto</a:t>
-            </a:r>
-            <a:r>
-              <a:rPr lang="en-SG" sz="1200" b="1" dirty="0"/>
-              <a:t>(prerender: false)] </a:t>
-            </a:r>
-            <a:r>
-              <a:rPr lang="en-US" altLang="zh-CN" sz="1200" dirty="0"/>
-              <a:t>will disable prerender</a:t>
-            </a:r>
-          </a:p>
-          <a:p>
-            <a:r>
               <a:rPr lang="en-SG" sz="1200" dirty="0"/>
               <a:t>Prerender at </a:t>
             </a:r>
@@ -17647,9 +17598,6 @@
               <a:t>SSRRenderModeBoundary.cs</a:t>
             </a:r>
             <a:endParaRPr lang="en-SG" sz="1200" b="1" dirty="0"/>
-          </a:p>
-          <a:p>
-            <a:endParaRPr lang="en-SG" sz="1200" dirty="0"/>
           </a:p>
         </p:txBody>
       </p:sp>
@@ -17675,7 +17623,7 @@
         </p:blipFill>
         <p:spPr>
           <a:xfrm>
-            <a:off x="921335" y="4667025"/>
+            <a:off x="713624" y="4207730"/>
             <a:ext cx="5382376" cy="1924319"/>
           </a:xfrm>
           <a:prstGeom prst="rect">
@@ -17754,7 +17702,7 @@
           <p:cNvPr id="2" name="Title 1">
             <a:extLst>
               <a:ext uri="{FF2B5EF4-FFF2-40B4-BE49-F238E27FC236}">
-                <a16:creationId xmlns:a16="http://schemas.microsoft.com/office/drawing/2014/main" id="{3D8D8576-F877-1D22-D036-518B771B7A74}"/>
+                <a16:creationId xmlns:a16="http://schemas.microsoft.com/office/drawing/2014/main" id="{5F8DF6F0-A65F-1BCE-772C-EDA41D90B8C0}"/>
               </a:ext>
             </a:extLst>
           </p:cNvPr>
@@ -17784,10 +17732,46 @@
       </p:sp>
       <p:sp>
         <p:nvSpPr>
-          <p:cNvPr id="9" name="TextBox 8">
+          <p:cNvPr id="3" name="Content Placeholder 2">
             <a:extLst>
               <a:ext uri="{FF2B5EF4-FFF2-40B4-BE49-F238E27FC236}">
-                <a16:creationId xmlns:a16="http://schemas.microsoft.com/office/drawing/2014/main" id="{A65927EF-441C-AEAF-9F93-4F645A7737DF}"/>
+                <a16:creationId xmlns:a16="http://schemas.microsoft.com/office/drawing/2014/main" id="{B10825B6-ED58-382E-5066-73CC4C67868B}"/>
+              </a:ext>
+            </a:extLst>
+          </p:cNvPr>
+          <p:cNvSpPr>
+            <a:spLocks noGrp="1"/>
+          </p:cNvSpPr>
+          <p:nvPr>
+            <p:ph idx="1"/>
+          </p:nvPr>
+        </p:nvSpPr>
+        <p:spPr>
+          <a:xfrm>
+            <a:off x="691078" y="2877908"/>
+            <a:ext cx="10324999" cy="1072655"/>
+          </a:xfrm>
+        </p:spPr>
+        <p:txBody>
+          <a:bodyPr>
+            <a:noAutofit/>
+          </a:bodyPr>
+          <a:lstStyle/>
+          <a:p>
+            <a:r>
+              <a:rPr lang="en-SG" sz="1200" dirty="0"/>
+              <a:t>Can disable prerender as follow:</a:t>
+            </a:r>
+            <a:endParaRPr lang="en-SG" sz="1200" b="1" dirty="0"/>
+          </a:p>
+        </p:txBody>
+      </p:sp>
+      <p:sp>
+        <p:nvSpPr>
+          <p:cNvPr id="5" name="TextBox 4">
+            <a:extLst>
+              <a:ext uri="{FF2B5EF4-FFF2-40B4-BE49-F238E27FC236}">
+                <a16:creationId xmlns:a16="http://schemas.microsoft.com/office/drawing/2014/main" id="{B36BD462-61B7-A83A-E3DC-27789CC76635}"/>
               </a:ext>
             </a:extLst>
           </p:cNvPr>
@@ -17818,79 +17802,755 @@
           </a:p>
         </p:txBody>
       </p:sp>
-      <p:pic>
-        <p:nvPicPr>
-          <p:cNvPr id="13" name="Picture 12">
+      <p:sp>
+        <p:nvSpPr>
+          <p:cNvPr id="7" name="TextBox 6">
             <a:extLst>
               <a:ext uri="{FF2B5EF4-FFF2-40B4-BE49-F238E27FC236}">
-                <a16:creationId xmlns:a16="http://schemas.microsoft.com/office/drawing/2014/main" id="{202B25F0-2FE7-E08E-2F88-2DF143CA19A4}"/>
+                <a16:creationId xmlns:a16="http://schemas.microsoft.com/office/drawing/2014/main" id="{89323F90-6B7E-D22E-FA96-E5291EC49C22}"/>
               </a:ext>
             </a:extLst>
           </p:cNvPr>
-          <p:cNvPicPr>
-            <a:picLocks noChangeAspect="1"/>
-          </p:cNvPicPr>
+          <p:cNvSpPr txBox="1"/>
           <p:nvPr/>
-        </p:nvPicPr>
-        <p:blipFill>
-          <a:blip r:embed="rId2"/>
-          <a:stretch>
-            <a:fillRect/>
-          </a:stretch>
-        </p:blipFill>
+        </p:nvSpPr>
         <p:spPr>
           <a:xfrm>
-            <a:off x="3733800" y="2354347"/>
-            <a:ext cx="7938752" cy="4458310"/>
+            <a:off x="691078" y="3296878"/>
+            <a:ext cx="7546019" cy="1615827"/>
           </a:xfrm>
           <a:prstGeom prst="rect">
             <a:avLst/>
           </a:prstGeom>
+          <a:noFill/>
         </p:spPr>
-      </p:pic>
+        <p:txBody>
+          <a:bodyPr wrap="square">
+            <a:spAutoFit/>
+          </a:bodyPr>
+          <a:lstStyle/>
+          <a:p>
+            <a:r>
+              <a:rPr lang="en-SG" sz="1100" dirty="0">
+                <a:solidFill>
+                  <a:srgbClr val="0000FF"/>
+                </a:solidFill>
+                <a:latin typeface="Cascadia Mono" panose="020B0609020000020004" pitchFamily="49" charset="0"/>
+              </a:rPr>
+              <a:t>public</a:t>
+            </a:r>
+            <a:r>
+              <a:rPr lang="en-SG" sz="1100" dirty="0">
+                <a:solidFill>
+                  <a:srgbClr val="000000"/>
+                </a:solidFill>
+                <a:latin typeface="Cascadia Mono" panose="020B0609020000020004" pitchFamily="49" charset="0"/>
+              </a:rPr>
+              <a:t> </a:t>
+            </a:r>
+            <a:r>
+              <a:rPr lang="en-SG" sz="1100" dirty="0">
+                <a:solidFill>
+                  <a:srgbClr val="0000FF"/>
+                </a:solidFill>
+                <a:latin typeface="Cascadia Mono" panose="020B0609020000020004" pitchFamily="49" charset="0"/>
+              </a:rPr>
+              <a:t>static</a:t>
+            </a:r>
+            <a:r>
+              <a:rPr lang="en-SG" sz="1100" dirty="0">
+                <a:solidFill>
+                  <a:srgbClr val="000000"/>
+                </a:solidFill>
+                <a:latin typeface="Cascadia Mono" panose="020B0609020000020004" pitchFamily="49" charset="0"/>
+              </a:rPr>
+              <a:t> </a:t>
+            </a:r>
+            <a:r>
+              <a:rPr lang="en-SG" sz="1100" dirty="0">
+                <a:solidFill>
+                  <a:srgbClr val="0000FF"/>
+                </a:solidFill>
+                <a:latin typeface="Cascadia Mono" panose="020B0609020000020004" pitchFamily="49" charset="0"/>
+              </a:rPr>
+              <a:t>class</a:t>
+            </a:r>
+            <a:r>
+              <a:rPr lang="en-SG" sz="1100" dirty="0">
+                <a:solidFill>
+                  <a:srgbClr val="000000"/>
+                </a:solidFill>
+                <a:latin typeface="Cascadia Mono" panose="020B0609020000020004" pitchFamily="49" charset="0"/>
+              </a:rPr>
+              <a:t> </a:t>
+            </a:r>
+            <a:r>
+              <a:rPr lang="en-SG" sz="1100" dirty="0" err="1">
+                <a:solidFill>
+                  <a:srgbClr val="2B91AF"/>
+                </a:solidFill>
+                <a:latin typeface="Cascadia Mono" panose="020B0609020000020004" pitchFamily="49" charset="0"/>
+              </a:rPr>
+              <a:t>CustomerRenderMode</a:t>
+            </a:r>
+            <a:endParaRPr lang="en-SG" sz="1100" dirty="0">
+              <a:solidFill>
+                <a:srgbClr val="000000"/>
+              </a:solidFill>
+              <a:latin typeface="Cascadia Mono" panose="020B0609020000020004" pitchFamily="49" charset="0"/>
+            </a:endParaRPr>
+          </a:p>
+          <a:p>
+            <a:r>
+              <a:rPr lang="en-SG" sz="1100" dirty="0">
+                <a:solidFill>
+                  <a:srgbClr val="000000"/>
+                </a:solidFill>
+                <a:latin typeface="Cascadia Mono" panose="020B0609020000020004" pitchFamily="49" charset="0"/>
+              </a:rPr>
+              <a:t>{</a:t>
+            </a:r>
+          </a:p>
+          <a:p>
+            <a:r>
+              <a:rPr lang="en-SG" sz="1100" dirty="0">
+                <a:solidFill>
+                  <a:srgbClr val="000000"/>
+                </a:solidFill>
+                <a:latin typeface="Cascadia Mono" panose="020B0609020000020004" pitchFamily="49" charset="0"/>
+              </a:rPr>
+              <a:t>    </a:t>
+            </a:r>
+            <a:r>
+              <a:rPr lang="en-SG" sz="1100" dirty="0">
+                <a:solidFill>
+                  <a:srgbClr val="0000FF"/>
+                </a:solidFill>
+                <a:latin typeface="Cascadia Mono" panose="020B0609020000020004" pitchFamily="49" charset="0"/>
+              </a:rPr>
+              <a:t>public</a:t>
+            </a:r>
+            <a:r>
+              <a:rPr lang="en-SG" sz="1100" dirty="0">
+                <a:solidFill>
+                  <a:srgbClr val="000000"/>
+                </a:solidFill>
+                <a:latin typeface="Cascadia Mono" panose="020B0609020000020004" pitchFamily="49" charset="0"/>
+              </a:rPr>
+              <a:t> </a:t>
+            </a:r>
+            <a:r>
+              <a:rPr lang="en-SG" sz="1100" dirty="0">
+                <a:solidFill>
+                  <a:srgbClr val="0000FF"/>
+                </a:solidFill>
+                <a:latin typeface="Cascadia Mono" panose="020B0609020000020004" pitchFamily="49" charset="0"/>
+              </a:rPr>
+              <a:t>static</a:t>
+            </a:r>
+            <a:r>
+              <a:rPr lang="en-SG" sz="1100" dirty="0">
+                <a:solidFill>
+                  <a:srgbClr val="000000"/>
+                </a:solidFill>
+                <a:latin typeface="Cascadia Mono" panose="020B0609020000020004" pitchFamily="49" charset="0"/>
+              </a:rPr>
+              <a:t> </a:t>
+            </a:r>
+            <a:r>
+              <a:rPr lang="en-SG" sz="1100" dirty="0" err="1">
+                <a:solidFill>
+                  <a:srgbClr val="000000"/>
+                </a:solidFill>
+                <a:latin typeface="Cascadia Mono" panose="020B0609020000020004" pitchFamily="49" charset="0"/>
+              </a:rPr>
+              <a:t>IComponentRenderMode</a:t>
+            </a:r>
+            <a:r>
+              <a:rPr lang="en-SG" sz="1100" dirty="0">
+                <a:solidFill>
+                  <a:srgbClr val="000000"/>
+                </a:solidFill>
+                <a:latin typeface="Cascadia Mono" panose="020B0609020000020004" pitchFamily="49" charset="0"/>
+              </a:rPr>
+              <a:t> </a:t>
+            </a:r>
+            <a:r>
+              <a:rPr lang="en-SG" sz="1100" dirty="0" err="1">
+                <a:solidFill>
+                  <a:srgbClr val="000000"/>
+                </a:solidFill>
+                <a:latin typeface="Cascadia Mono" panose="020B0609020000020004" pitchFamily="49" charset="0"/>
+              </a:rPr>
+              <a:t>InteractiveServerWithoutPrerender</a:t>
+            </a:r>
+            <a:r>
+              <a:rPr lang="en-SG" sz="1100" dirty="0">
+                <a:solidFill>
+                  <a:srgbClr val="000000"/>
+                </a:solidFill>
+                <a:latin typeface="Cascadia Mono" panose="020B0609020000020004" pitchFamily="49" charset="0"/>
+              </a:rPr>
+              <a:t> { </a:t>
+            </a:r>
+            <a:r>
+              <a:rPr lang="en-SG" sz="1100" dirty="0">
+                <a:solidFill>
+                  <a:srgbClr val="0000FF"/>
+                </a:solidFill>
+                <a:latin typeface="Cascadia Mono" panose="020B0609020000020004" pitchFamily="49" charset="0"/>
+              </a:rPr>
+              <a:t>get</a:t>
+            </a:r>
+            <a:r>
+              <a:rPr lang="en-SG" sz="1100" dirty="0">
+                <a:solidFill>
+                  <a:srgbClr val="000000"/>
+                </a:solidFill>
+                <a:latin typeface="Cascadia Mono" panose="020B0609020000020004" pitchFamily="49" charset="0"/>
+              </a:rPr>
+              <a:t>; } </a:t>
+            </a:r>
+          </a:p>
+          <a:p>
+            <a:r>
+              <a:rPr lang="en-SG" sz="1100" dirty="0">
+                <a:solidFill>
+                  <a:srgbClr val="000000"/>
+                </a:solidFill>
+                <a:latin typeface="Cascadia Mono" panose="020B0609020000020004" pitchFamily="49" charset="0"/>
+              </a:rPr>
+              <a:t>        = </a:t>
+            </a:r>
+            <a:r>
+              <a:rPr lang="en-SG" sz="1100" dirty="0">
+                <a:solidFill>
+                  <a:srgbClr val="0000FF"/>
+                </a:solidFill>
+                <a:latin typeface="Cascadia Mono" panose="020B0609020000020004" pitchFamily="49" charset="0"/>
+              </a:rPr>
+              <a:t>new</a:t>
+            </a:r>
+            <a:r>
+              <a:rPr lang="en-SG" sz="1100" dirty="0">
+                <a:solidFill>
+                  <a:srgbClr val="000000"/>
+                </a:solidFill>
+                <a:latin typeface="Cascadia Mono" panose="020B0609020000020004" pitchFamily="49" charset="0"/>
+              </a:rPr>
+              <a:t> </a:t>
+            </a:r>
+            <a:r>
+              <a:rPr lang="en-SG" sz="1100" dirty="0" err="1">
+                <a:solidFill>
+                  <a:srgbClr val="000000"/>
+                </a:solidFill>
+                <a:latin typeface="Cascadia Mono" panose="020B0609020000020004" pitchFamily="49" charset="0"/>
+              </a:rPr>
+              <a:t>InteractiveServerRenderMode</a:t>
+            </a:r>
+            <a:r>
+              <a:rPr lang="en-SG" sz="1100" dirty="0">
+                <a:solidFill>
+                  <a:srgbClr val="000000"/>
+                </a:solidFill>
+                <a:latin typeface="Cascadia Mono" panose="020B0609020000020004" pitchFamily="49" charset="0"/>
+              </a:rPr>
+              <a:t>(prerender: </a:t>
+            </a:r>
+            <a:r>
+              <a:rPr lang="en-SG" sz="1100" dirty="0">
+                <a:solidFill>
+                  <a:srgbClr val="0000FF"/>
+                </a:solidFill>
+                <a:latin typeface="Cascadia Mono" panose="020B0609020000020004" pitchFamily="49" charset="0"/>
+              </a:rPr>
+              <a:t>false</a:t>
+            </a:r>
+            <a:r>
+              <a:rPr lang="en-SG" sz="1100" dirty="0">
+                <a:solidFill>
+                  <a:srgbClr val="000000"/>
+                </a:solidFill>
+                <a:latin typeface="Cascadia Mono" panose="020B0609020000020004" pitchFamily="49" charset="0"/>
+              </a:rPr>
+              <a:t>);</a:t>
+            </a:r>
+          </a:p>
+          <a:p>
+            <a:r>
+              <a:rPr lang="en-SG" sz="1100" dirty="0">
+                <a:solidFill>
+                  <a:srgbClr val="000000"/>
+                </a:solidFill>
+                <a:latin typeface="Cascadia Mono" panose="020B0609020000020004" pitchFamily="49" charset="0"/>
+              </a:rPr>
+              <a:t>    </a:t>
+            </a:r>
+            <a:r>
+              <a:rPr lang="en-SG" sz="1100" dirty="0">
+                <a:solidFill>
+                  <a:srgbClr val="0000FF"/>
+                </a:solidFill>
+                <a:latin typeface="Cascadia Mono" panose="020B0609020000020004" pitchFamily="49" charset="0"/>
+              </a:rPr>
+              <a:t>public</a:t>
+            </a:r>
+            <a:r>
+              <a:rPr lang="en-SG" sz="1100" dirty="0">
+                <a:solidFill>
+                  <a:srgbClr val="000000"/>
+                </a:solidFill>
+                <a:latin typeface="Cascadia Mono" panose="020B0609020000020004" pitchFamily="49" charset="0"/>
+              </a:rPr>
+              <a:t> </a:t>
+            </a:r>
+            <a:r>
+              <a:rPr lang="en-SG" sz="1100" dirty="0">
+                <a:solidFill>
+                  <a:srgbClr val="0000FF"/>
+                </a:solidFill>
+                <a:latin typeface="Cascadia Mono" panose="020B0609020000020004" pitchFamily="49" charset="0"/>
+              </a:rPr>
+              <a:t>static</a:t>
+            </a:r>
+            <a:r>
+              <a:rPr lang="en-SG" sz="1100" dirty="0">
+                <a:solidFill>
+                  <a:srgbClr val="000000"/>
+                </a:solidFill>
+                <a:latin typeface="Cascadia Mono" panose="020B0609020000020004" pitchFamily="49" charset="0"/>
+              </a:rPr>
+              <a:t> </a:t>
+            </a:r>
+            <a:r>
+              <a:rPr lang="en-SG" sz="1100" dirty="0" err="1">
+                <a:solidFill>
+                  <a:srgbClr val="000000"/>
+                </a:solidFill>
+                <a:latin typeface="Cascadia Mono" panose="020B0609020000020004" pitchFamily="49" charset="0"/>
+              </a:rPr>
+              <a:t>IComponentRenderMode</a:t>
+            </a:r>
+            <a:r>
+              <a:rPr lang="en-SG" sz="1100" dirty="0">
+                <a:solidFill>
+                  <a:srgbClr val="000000"/>
+                </a:solidFill>
+                <a:latin typeface="Cascadia Mono" panose="020B0609020000020004" pitchFamily="49" charset="0"/>
+              </a:rPr>
+              <a:t> </a:t>
+            </a:r>
+            <a:r>
+              <a:rPr lang="en-SG" sz="1100" dirty="0" err="1">
+                <a:solidFill>
+                  <a:srgbClr val="000000"/>
+                </a:solidFill>
+                <a:latin typeface="Cascadia Mono" panose="020B0609020000020004" pitchFamily="49" charset="0"/>
+              </a:rPr>
+              <a:t>InteractiveAutoWithoutPrerender</a:t>
+            </a:r>
+            <a:r>
+              <a:rPr lang="en-SG" sz="1100" dirty="0">
+                <a:solidFill>
+                  <a:srgbClr val="000000"/>
+                </a:solidFill>
+                <a:latin typeface="Cascadia Mono" panose="020B0609020000020004" pitchFamily="49" charset="0"/>
+              </a:rPr>
+              <a:t> { </a:t>
+            </a:r>
+            <a:r>
+              <a:rPr lang="en-SG" sz="1100" dirty="0">
+                <a:solidFill>
+                  <a:srgbClr val="0000FF"/>
+                </a:solidFill>
+                <a:latin typeface="Cascadia Mono" panose="020B0609020000020004" pitchFamily="49" charset="0"/>
+              </a:rPr>
+              <a:t>get</a:t>
+            </a:r>
+            <a:r>
+              <a:rPr lang="en-SG" sz="1100" dirty="0">
+                <a:solidFill>
+                  <a:srgbClr val="000000"/>
+                </a:solidFill>
+                <a:latin typeface="Cascadia Mono" panose="020B0609020000020004" pitchFamily="49" charset="0"/>
+              </a:rPr>
+              <a:t>; } </a:t>
+            </a:r>
+          </a:p>
+          <a:p>
+            <a:r>
+              <a:rPr lang="en-SG" sz="1100" dirty="0">
+                <a:solidFill>
+                  <a:srgbClr val="000000"/>
+                </a:solidFill>
+                <a:latin typeface="Cascadia Mono" panose="020B0609020000020004" pitchFamily="49" charset="0"/>
+              </a:rPr>
+              <a:t>        = </a:t>
+            </a:r>
+            <a:r>
+              <a:rPr lang="en-SG" sz="1100" dirty="0">
+                <a:solidFill>
+                  <a:srgbClr val="0000FF"/>
+                </a:solidFill>
+                <a:latin typeface="Cascadia Mono" panose="020B0609020000020004" pitchFamily="49" charset="0"/>
+              </a:rPr>
+              <a:t>new</a:t>
+            </a:r>
+            <a:r>
+              <a:rPr lang="en-SG" sz="1100" dirty="0">
+                <a:solidFill>
+                  <a:srgbClr val="000000"/>
+                </a:solidFill>
+                <a:latin typeface="Cascadia Mono" panose="020B0609020000020004" pitchFamily="49" charset="0"/>
+              </a:rPr>
+              <a:t> </a:t>
+            </a:r>
+            <a:r>
+              <a:rPr lang="en-SG" sz="1100" dirty="0" err="1">
+                <a:solidFill>
+                  <a:srgbClr val="000000"/>
+                </a:solidFill>
+                <a:latin typeface="Cascadia Mono" panose="020B0609020000020004" pitchFamily="49" charset="0"/>
+              </a:rPr>
+              <a:t>InteractiveAutoRenderMode</a:t>
+            </a:r>
+            <a:r>
+              <a:rPr lang="en-SG" sz="1100" dirty="0">
+                <a:solidFill>
+                  <a:srgbClr val="000000"/>
+                </a:solidFill>
+                <a:latin typeface="Cascadia Mono" panose="020B0609020000020004" pitchFamily="49" charset="0"/>
+              </a:rPr>
+              <a:t>(prerender: </a:t>
+            </a:r>
+            <a:r>
+              <a:rPr lang="en-SG" sz="1100" dirty="0">
+                <a:solidFill>
+                  <a:srgbClr val="0000FF"/>
+                </a:solidFill>
+                <a:latin typeface="Cascadia Mono" panose="020B0609020000020004" pitchFamily="49" charset="0"/>
+              </a:rPr>
+              <a:t>false</a:t>
+            </a:r>
+            <a:r>
+              <a:rPr lang="en-SG" sz="1100" dirty="0">
+                <a:solidFill>
+                  <a:srgbClr val="000000"/>
+                </a:solidFill>
+                <a:latin typeface="Cascadia Mono" panose="020B0609020000020004" pitchFamily="49" charset="0"/>
+              </a:rPr>
+              <a:t>);</a:t>
+            </a:r>
+          </a:p>
+          <a:p>
+            <a:r>
+              <a:rPr lang="en-SG" sz="1100" dirty="0">
+                <a:solidFill>
+                  <a:srgbClr val="000000"/>
+                </a:solidFill>
+                <a:latin typeface="Cascadia Mono" panose="020B0609020000020004" pitchFamily="49" charset="0"/>
+              </a:rPr>
+              <a:t>    </a:t>
+            </a:r>
+            <a:r>
+              <a:rPr lang="en-SG" sz="1100" dirty="0">
+                <a:solidFill>
+                  <a:srgbClr val="0000FF"/>
+                </a:solidFill>
+                <a:latin typeface="Cascadia Mono" panose="020B0609020000020004" pitchFamily="49" charset="0"/>
+              </a:rPr>
+              <a:t>public</a:t>
+            </a:r>
+            <a:r>
+              <a:rPr lang="en-SG" sz="1100" dirty="0">
+                <a:solidFill>
+                  <a:srgbClr val="000000"/>
+                </a:solidFill>
+                <a:latin typeface="Cascadia Mono" panose="020B0609020000020004" pitchFamily="49" charset="0"/>
+              </a:rPr>
+              <a:t> </a:t>
+            </a:r>
+            <a:r>
+              <a:rPr lang="en-SG" sz="1100" dirty="0">
+                <a:solidFill>
+                  <a:srgbClr val="0000FF"/>
+                </a:solidFill>
+                <a:latin typeface="Cascadia Mono" panose="020B0609020000020004" pitchFamily="49" charset="0"/>
+              </a:rPr>
+              <a:t>static</a:t>
+            </a:r>
+            <a:r>
+              <a:rPr lang="en-SG" sz="1100" dirty="0">
+                <a:solidFill>
+                  <a:srgbClr val="000000"/>
+                </a:solidFill>
+                <a:latin typeface="Cascadia Mono" panose="020B0609020000020004" pitchFamily="49" charset="0"/>
+              </a:rPr>
+              <a:t> </a:t>
+            </a:r>
+            <a:r>
+              <a:rPr lang="en-SG" sz="1100" dirty="0" err="1">
+                <a:solidFill>
+                  <a:srgbClr val="000000"/>
+                </a:solidFill>
+                <a:latin typeface="Cascadia Mono" panose="020B0609020000020004" pitchFamily="49" charset="0"/>
+              </a:rPr>
+              <a:t>IComponentRenderMode</a:t>
+            </a:r>
+            <a:r>
+              <a:rPr lang="en-SG" sz="1100" dirty="0">
+                <a:solidFill>
+                  <a:srgbClr val="000000"/>
+                </a:solidFill>
+                <a:latin typeface="Cascadia Mono" panose="020B0609020000020004" pitchFamily="49" charset="0"/>
+              </a:rPr>
+              <a:t> </a:t>
+            </a:r>
+            <a:r>
+              <a:rPr lang="en-SG" sz="1100" dirty="0" err="1">
+                <a:solidFill>
+                  <a:srgbClr val="000000"/>
+                </a:solidFill>
+                <a:latin typeface="Cascadia Mono" panose="020B0609020000020004" pitchFamily="49" charset="0"/>
+              </a:rPr>
+              <a:t>InteractiveWebAssemblyWithoutPrerender</a:t>
+            </a:r>
+            <a:r>
+              <a:rPr lang="en-SG" sz="1100" dirty="0">
+                <a:solidFill>
+                  <a:srgbClr val="000000"/>
+                </a:solidFill>
+                <a:latin typeface="Cascadia Mono" panose="020B0609020000020004" pitchFamily="49" charset="0"/>
+              </a:rPr>
+              <a:t> { </a:t>
+            </a:r>
+            <a:r>
+              <a:rPr lang="en-SG" sz="1100" dirty="0">
+                <a:solidFill>
+                  <a:srgbClr val="0000FF"/>
+                </a:solidFill>
+                <a:latin typeface="Cascadia Mono" panose="020B0609020000020004" pitchFamily="49" charset="0"/>
+              </a:rPr>
+              <a:t>get</a:t>
+            </a:r>
+            <a:r>
+              <a:rPr lang="en-SG" sz="1100" dirty="0">
+                <a:solidFill>
+                  <a:srgbClr val="000000"/>
+                </a:solidFill>
+                <a:latin typeface="Cascadia Mono" panose="020B0609020000020004" pitchFamily="49" charset="0"/>
+              </a:rPr>
+              <a:t>; } </a:t>
+            </a:r>
+          </a:p>
+          <a:p>
+            <a:r>
+              <a:rPr lang="en-SG" sz="1100" dirty="0">
+                <a:solidFill>
+                  <a:srgbClr val="000000"/>
+                </a:solidFill>
+                <a:latin typeface="Cascadia Mono" panose="020B0609020000020004" pitchFamily="49" charset="0"/>
+              </a:rPr>
+              <a:t>        = </a:t>
+            </a:r>
+            <a:r>
+              <a:rPr lang="en-SG" sz="1100" dirty="0">
+                <a:solidFill>
+                  <a:srgbClr val="0000FF"/>
+                </a:solidFill>
+                <a:latin typeface="Cascadia Mono" panose="020B0609020000020004" pitchFamily="49" charset="0"/>
+              </a:rPr>
+              <a:t>new</a:t>
+            </a:r>
+            <a:r>
+              <a:rPr lang="en-SG" sz="1100" dirty="0">
+                <a:solidFill>
+                  <a:srgbClr val="000000"/>
+                </a:solidFill>
+                <a:latin typeface="Cascadia Mono" panose="020B0609020000020004" pitchFamily="49" charset="0"/>
+              </a:rPr>
+              <a:t> </a:t>
+            </a:r>
+            <a:r>
+              <a:rPr lang="en-SG" sz="1100" dirty="0" err="1">
+                <a:solidFill>
+                  <a:srgbClr val="000000"/>
+                </a:solidFill>
+                <a:latin typeface="Cascadia Mono" panose="020B0609020000020004" pitchFamily="49" charset="0"/>
+              </a:rPr>
+              <a:t>InteractiveWebAssemblyRenderMode</a:t>
+            </a:r>
+            <a:r>
+              <a:rPr lang="en-SG" sz="1100" dirty="0">
+                <a:solidFill>
+                  <a:srgbClr val="000000"/>
+                </a:solidFill>
+                <a:latin typeface="Cascadia Mono" panose="020B0609020000020004" pitchFamily="49" charset="0"/>
+              </a:rPr>
+              <a:t>(prerender: </a:t>
+            </a:r>
+            <a:r>
+              <a:rPr lang="en-SG" sz="1100" dirty="0">
+                <a:solidFill>
+                  <a:srgbClr val="0000FF"/>
+                </a:solidFill>
+                <a:latin typeface="Cascadia Mono" panose="020B0609020000020004" pitchFamily="49" charset="0"/>
+              </a:rPr>
+              <a:t>false</a:t>
+            </a:r>
+            <a:r>
+              <a:rPr lang="en-SG" sz="1100" dirty="0">
+                <a:solidFill>
+                  <a:srgbClr val="000000"/>
+                </a:solidFill>
+                <a:latin typeface="Cascadia Mono" panose="020B0609020000020004" pitchFamily="49" charset="0"/>
+              </a:rPr>
+              <a:t>);</a:t>
+            </a:r>
+          </a:p>
+          <a:p>
+            <a:r>
+              <a:rPr lang="en-SG" sz="1100" dirty="0">
+                <a:solidFill>
+                  <a:srgbClr val="000000"/>
+                </a:solidFill>
+                <a:latin typeface="Cascadia Mono" panose="020B0609020000020004" pitchFamily="49" charset="0"/>
+              </a:rPr>
+              <a:t>}</a:t>
+            </a:r>
+            <a:endParaRPr lang="en-SG" sz="800" dirty="0"/>
+          </a:p>
+        </p:txBody>
+      </p:sp>
       <p:sp>
         <p:nvSpPr>
-          <p:cNvPr id="16" name="Content Placeholder 2">
+          <p:cNvPr id="9" name="TextBox 8">
             <a:extLst>
               <a:ext uri="{FF2B5EF4-FFF2-40B4-BE49-F238E27FC236}">
-                <a16:creationId xmlns:a16="http://schemas.microsoft.com/office/drawing/2014/main" id="{8C9B23BB-6B98-32E7-9E29-0B50E95A4228}"/>
+                <a16:creationId xmlns:a16="http://schemas.microsoft.com/office/drawing/2014/main" id="{2DE9A815-1487-81D0-C8D5-80EAFBAA3376}"/>
               </a:ext>
             </a:extLst>
           </p:cNvPr>
-          <p:cNvSpPr>
-            <a:spLocks noGrp="1"/>
-          </p:cNvSpPr>
-          <p:nvPr>
-            <p:ph idx="1"/>
-          </p:nvPr>
+          <p:cNvSpPr txBox="1"/>
+          <p:nvPr/>
         </p:nvSpPr>
         <p:spPr>
           <a:xfrm>
-            <a:off x="691078" y="2907807"/>
-            <a:ext cx="2877745" cy="1226515"/>
+            <a:off x="691078" y="5485718"/>
+            <a:ext cx="6038196" cy="430887"/>
           </a:xfrm>
+          <a:prstGeom prst="rect">
+            <a:avLst/>
+          </a:prstGeom>
+          <a:noFill/>
         </p:spPr>
         <p:txBody>
-          <a:bodyPr>
-            <a:normAutofit/>
+          <a:bodyPr wrap="square">
+            <a:spAutoFit/>
           </a:bodyPr>
           <a:lstStyle/>
           <a:p>
             <a:r>
-              <a:rPr lang="en-SG" sz="1200" dirty="0" err="1"/>
-              <a:t>PreRender</a:t>
-            </a:r>
-            <a:r>
-              <a:rPr lang="en-SG" sz="1200" dirty="0"/>
-              <a:t> enabled and rendering at server side</a:t>
-            </a:r>
+              <a:rPr lang="en-SG" sz="1100" dirty="0">
+                <a:solidFill>
+                  <a:srgbClr val="000000"/>
+                </a:solidFill>
+                <a:latin typeface="Cascadia Mono" panose="020B0609020000020004" pitchFamily="49" charset="0"/>
+              </a:rPr>
+              <a:t>@page </a:t>
+            </a:r>
+            <a:r>
+              <a:rPr lang="en-SG" sz="1100" dirty="0">
+                <a:solidFill>
+                  <a:srgbClr val="A31515"/>
+                </a:solidFill>
+                <a:latin typeface="Cascadia Mono" panose="020B0609020000020004" pitchFamily="49" charset="0"/>
+              </a:rPr>
+              <a:t>"/prerendered-counter-server"</a:t>
+            </a:r>
+            <a:endParaRPr lang="en-SG" sz="1100" dirty="0">
+              <a:solidFill>
+                <a:srgbClr val="000000"/>
+              </a:solidFill>
+              <a:latin typeface="Cascadia Mono" panose="020B0609020000020004" pitchFamily="49" charset="0"/>
+            </a:endParaRPr>
+          </a:p>
+          <a:p>
+            <a:r>
+              <a:rPr lang="en-SG" sz="1100" dirty="0">
+                <a:solidFill>
+                  <a:srgbClr val="000000"/>
+                </a:solidFill>
+                <a:latin typeface="Cascadia Mono" panose="020B0609020000020004" pitchFamily="49" charset="0"/>
+              </a:rPr>
+              <a:t>@rendermode </a:t>
+            </a:r>
+            <a:r>
+              <a:rPr lang="en-SG" sz="1100" dirty="0" err="1">
+                <a:solidFill>
+                  <a:srgbClr val="2B91AF"/>
+                </a:solidFill>
+                <a:latin typeface="Cascadia Mono" panose="020B0609020000020004" pitchFamily="49" charset="0"/>
+              </a:rPr>
+              <a:t>CustomerRenderMode</a:t>
+            </a:r>
+            <a:r>
+              <a:rPr lang="en-SG" sz="1100" dirty="0" err="1">
+                <a:solidFill>
+                  <a:srgbClr val="000000"/>
+                </a:solidFill>
+                <a:latin typeface="Cascadia Mono" panose="020B0609020000020004" pitchFamily="49" charset="0"/>
+              </a:rPr>
+              <a:t>.InteractiveWebAssemblyWithoutPrerender</a:t>
+            </a:r>
+            <a:endParaRPr lang="en-SG" sz="1100" dirty="0"/>
+          </a:p>
+        </p:txBody>
+      </p:sp>
+      <p:sp>
+        <p:nvSpPr>
+          <p:cNvPr id="10" name="TextBox 9">
+            <a:extLst>
+              <a:ext uri="{FF2B5EF4-FFF2-40B4-BE49-F238E27FC236}">
+                <a16:creationId xmlns:a16="http://schemas.microsoft.com/office/drawing/2014/main" id="{00F0D238-5DAC-D159-E540-842A8CE75F49}"/>
+              </a:ext>
+            </a:extLst>
+          </p:cNvPr>
+          <p:cNvSpPr txBox="1"/>
+          <p:nvPr/>
+        </p:nvSpPr>
+        <p:spPr>
+          <a:xfrm>
+            <a:off x="691078" y="5168434"/>
+            <a:ext cx="6115050" cy="276999"/>
+          </a:xfrm>
+          <a:prstGeom prst="rect">
+            <a:avLst/>
+          </a:prstGeom>
+          <a:noFill/>
+        </p:spPr>
+        <p:txBody>
+          <a:bodyPr wrap="square">
+            <a:spAutoFit/>
+          </a:bodyPr>
+          <a:lstStyle/>
+          <a:p>
+            <a:pPr marL="0" indent="0">
+              <a:buNone/>
+            </a:pPr>
+            <a:r>
+              <a:rPr lang="en-US" altLang="zh-CN" sz="1200" dirty="0" err="1"/>
+              <a:t>PrerenderedServer.razor</a:t>
+            </a:r>
+            <a:endParaRPr lang="en-US" altLang="zh-CN" sz="1100" dirty="0"/>
           </a:p>
         </p:txBody>
       </p:sp>
     </p:spTree>
     <p:extLst>
       <p:ext uri="{BB962C8B-B14F-4D97-AF65-F5344CB8AC3E}">
-        <p14:creationId xmlns:p14="http://schemas.microsoft.com/office/powerpoint/2010/main" val="1592738298"/>
+        <p14:creationId xmlns:p14="http://schemas.microsoft.com/office/powerpoint/2010/main" val="3719890373"/>
       </p:ext>
     </p:extLst>
   </p:cSld>
@@ -18020,6 +18680,174 @@
             </a:r>
             <a:r>
               <a:rPr lang="en-SG" sz="1200" dirty="0"/>
+              <a:t> enabled and rendering at server side</a:t>
+            </a:r>
+          </a:p>
+        </p:txBody>
+      </p:sp>
+      <p:pic>
+        <p:nvPicPr>
+          <p:cNvPr id="4" name="Picture 3">
+            <a:extLst>
+              <a:ext uri="{FF2B5EF4-FFF2-40B4-BE49-F238E27FC236}">
+                <a16:creationId xmlns:a16="http://schemas.microsoft.com/office/drawing/2014/main" id="{426D6259-7CFB-7493-C0C3-15DDB03A671B}"/>
+              </a:ext>
+            </a:extLst>
+          </p:cNvPr>
+          <p:cNvPicPr>
+            <a:picLocks noChangeAspect="1"/>
+          </p:cNvPicPr>
+          <p:nvPr/>
+        </p:nvPicPr>
+        <p:blipFill>
+          <a:blip r:embed="rId2"/>
+          <a:stretch>
+            <a:fillRect/>
+          </a:stretch>
+        </p:blipFill>
+        <p:spPr>
+          <a:xfrm>
+            <a:off x="4039340" y="2354347"/>
+            <a:ext cx="7865616" cy="4332158"/>
+          </a:xfrm>
+          <a:prstGeom prst="rect">
+            <a:avLst/>
+          </a:prstGeom>
+        </p:spPr>
+      </p:pic>
+    </p:spTree>
+    <p:extLst>
+      <p:ext uri="{BB962C8B-B14F-4D97-AF65-F5344CB8AC3E}">
+        <p14:creationId xmlns:p14="http://schemas.microsoft.com/office/powerpoint/2010/main" val="1592738298"/>
+      </p:ext>
+    </p:extLst>
+  </p:cSld>
+  <p:clrMapOvr>
+    <a:masterClrMapping/>
+  </p:clrMapOvr>
+</p:sld>
+</file>
+
+<file path=ppt/slides/slide16.xml><?xml version="1.0" encoding="utf-8"?>
+<p:sld xmlns:a="http://schemas.openxmlformats.org/drawingml/2006/main" xmlns:r="http://schemas.openxmlformats.org/officeDocument/2006/relationships" xmlns:p="http://schemas.openxmlformats.org/presentationml/2006/main">
+  <p:cSld>
+    <p:spTree>
+      <p:nvGrpSpPr>
+        <p:cNvPr id="1" name=""/>
+        <p:cNvGrpSpPr/>
+        <p:nvPr/>
+      </p:nvGrpSpPr>
+      <p:grpSpPr>
+        <a:xfrm>
+          <a:off x="0" y="0"/>
+          <a:ext cx="0" cy="0"/>
+          <a:chOff x="0" y="0"/>
+          <a:chExt cx="0" cy="0"/>
+        </a:xfrm>
+      </p:grpSpPr>
+      <p:sp>
+        <p:nvSpPr>
+          <p:cNvPr id="2" name="Title 1">
+            <a:extLst>
+              <a:ext uri="{FF2B5EF4-FFF2-40B4-BE49-F238E27FC236}">
+                <a16:creationId xmlns:a16="http://schemas.microsoft.com/office/drawing/2014/main" id="{3D8D8576-F877-1D22-D036-518B771B7A74}"/>
+              </a:ext>
+            </a:extLst>
+          </p:cNvPr>
+          <p:cNvSpPr>
+            <a:spLocks noGrp="1"/>
+          </p:cNvSpPr>
+          <p:nvPr>
+            <p:ph type="title"/>
+          </p:nvPr>
+        </p:nvSpPr>
+        <p:spPr/>
+        <p:txBody>
+          <a:bodyPr/>
+          <a:lstStyle/>
+          <a:p>
+            <a:r>
+              <a:rPr lang="en-US" altLang="zh-CN" sz="4400" dirty="0"/>
+              <a:t>Blazor Web </a:t>
+            </a:r>
+            <a:r>
+              <a:rPr lang="en-US" altLang="zh-CN" dirty="0"/>
+              <a:t>App</a:t>
+            </a:r>
+            <a:endParaRPr lang="en-SG" dirty="0"/>
+          </a:p>
+        </p:txBody>
+      </p:sp>
+      <p:sp>
+        <p:nvSpPr>
+          <p:cNvPr id="9" name="TextBox 8">
+            <a:extLst>
+              <a:ext uri="{FF2B5EF4-FFF2-40B4-BE49-F238E27FC236}">
+                <a16:creationId xmlns:a16="http://schemas.microsoft.com/office/drawing/2014/main" id="{A65927EF-441C-AEAF-9F93-4F645A7737DF}"/>
+              </a:ext>
+            </a:extLst>
+          </p:cNvPr>
+          <p:cNvSpPr txBox="1"/>
+          <p:nvPr/>
+        </p:nvSpPr>
+        <p:spPr>
+          <a:xfrm>
+            <a:off x="691079" y="2354347"/>
+            <a:ext cx="1865690" cy="369332"/>
+          </a:xfrm>
+          <a:prstGeom prst="rect">
+            <a:avLst/>
+          </a:prstGeom>
+          <a:noFill/>
+        </p:spPr>
+        <p:txBody>
+          <a:bodyPr wrap="square">
+            <a:spAutoFit/>
+          </a:bodyPr>
+          <a:lstStyle/>
+          <a:p>
+            <a:r>
+              <a:rPr lang="en-SG" dirty="0" err="1"/>
+              <a:t>PreRender</a:t>
+            </a:r>
+            <a:endParaRPr lang="en-SG" dirty="0"/>
+          </a:p>
+        </p:txBody>
+      </p:sp>
+      <p:sp>
+        <p:nvSpPr>
+          <p:cNvPr id="16" name="Content Placeholder 2">
+            <a:extLst>
+              <a:ext uri="{FF2B5EF4-FFF2-40B4-BE49-F238E27FC236}">
+                <a16:creationId xmlns:a16="http://schemas.microsoft.com/office/drawing/2014/main" id="{8C9B23BB-6B98-32E7-9E29-0B50E95A4228}"/>
+              </a:ext>
+            </a:extLst>
+          </p:cNvPr>
+          <p:cNvSpPr>
+            <a:spLocks noGrp="1"/>
+          </p:cNvSpPr>
+          <p:nvPr>
+            <p:ph idx="1"/>
+          </p:nvPr>
+        </p:nvSpPr>
+        <p:spPr>
+          <a:xfrm>
+            <a:off x="691078" y="2907807"/>
+            <a:ext cx="2877745" cy="1226515"/>
+          </a:xfrm>
+        </p:spPr>
+        <p:txBody>
+          <a:bodyPr>
+            <a:normAutofit/>
+          </a:bodyPr>
+          <a:lstStyle/>
+          <a:p>
+            <a:r>
+              <a:rPr lang="en-SG" sz="1200" dirty="0" err="1"/>
+              <a:t>PreRender</a:t>
+            </a:r>
+            <a:r>
+              <a:rPr lang="en-SG" sz="1200" dirty="0"/>
               <a:t> Disabled</a:t>
             </a:r>
           </a:p>
@@ -18068,7 +18896,7 @@
 </p:sld>
 </file>
 
-<file path=ppt/slides/slide16.xml><?xml version="1.0" encoding="utf-8"?>
+<file path=ppt/slides/slide17.xml><?xml version="1.0" encoding="utf-8"?>
 <p:sld xmlns:a="http://schemas.openxmlformats.org/drawingml/2006/main" xmlns:r="http://schemas.openxmlformats.org/officeDocument/2006/relationships" xmlns:p="http://schemas.openxmlformats.org/presentationml/2006/main">
   <p:cSld>
     <p:spTree>
@@ -21179,7 +22007,7 @@
 </p:sld>
 </file>
 
-<file path=ppt/slides/slide17.xml><?xml version="1.0" encoding="utf-8"?>
+<file path=ppt/slides/slide18.xml><?xml version="1.0" encoding="utf-8"?>
 <p:sld xmlns:a="http://schemas.openxmlformats.org/drawingml/2006/main" xmlns:r="http://schemas.openxmlformats.org/officeDocument/2006/relationships" xmlns:p="http://schemas.openxmlformats.org/presentationml/2006/main">
   <p:cSld>
     <p:spTree>
@@ -21994,12 +22822,20 @@
           </a:lstStyle>
           <a:p>
             <a:r>
-              <a:rPr lang="en-SG" sz="1200">
+              <a:rPr lang="en-SG" sz="1200" dirty="0" err="1">
                 <a:solidFill>
                   <a:srgbClr val="161616"/>
                 </a:solidFill>
               </a:rPr>
-              <a:t>QuickGrid is built to be a simple and convenient way to display your data, while still providing powerful features, such as sorting, filtering, paging, and virtualization.</a:t>
+              <a:t>QuickGrid</a:t>
+            </a:r>
+            <a:r>
+              <a:rPr lang="en-SG" sz="1200" dirty="0">
+                <a:solidFill>
+                  <a:srgbClr val="161616"/>
+                </a:solidFill>
+              </a:rPr>
+              <a:t> is built to be a simple and convenient way to display your data, while still providing powerful features, such as sorting, filtering, paging, and virtualization.</a:t>
             </a:r>
             <a:endParaRPr lang="en-SG" sz="1200" dirty="0"/>
           </a:p>
@@ -22054,6 +22890,556 @@
           </a:p>
         </p:txBody>
       </p:sp>
+      <p:sp>
+        <p:nvSpPr>
+          <p:cNvPr id="5" name="TextBox 4">
+            <a:extLst>
+              <a:ext uri="{FF2B5EF4-FFF2-40B4-BE49-F238E27FC236}">
+                <a16:creationId xmlns:a16="http://schemas.microsoft.com/office/drawing/2014/main" id="{139C9696-5A41-8E1B-510D-2A8E12DC79B4}"/>
+              </a:ext>
+            </a:extLst>
+          </p:cNvPr>
+          <p:cNvSpPr txBox="1"/>
+          <p:nvPr/>
+        </p:nvSpPr>
+        <p:spPr>
+          <a:xfrm>
+            <a:off x="956057" y="5526092"/>
+            <a:ext cx="8480906" cy="938719"/>
+          </a:xfrm>
+          <a:prstGeom prst="rect">
+            <a:avLst/>
+          </a:prstGeom>
+          <a:noFill/>
+        </p:spPr>
+        <p:txBody>
+          <a:bodyPr wrap="square">
+            <a:spAutoFit/>
+          </a:bodyPr>
+          <a:lstStyle/>
+          <a:p>
+            <a:r>
+              <a:rPr lang="en-SG" sz="1100" dirty="0">
+                <a:solidFill>
+                  <a:srgbClr val="0000FF"/>
+                </a:solidFill>
+                <a:latin typeface="Cascadia Mono" panose="020B0609020000020004" pitchFamily="49" charset="0"/>
+              </a:rPr>
+              <a:t>&lt;</a:t>
+            </a:r>
+            <a:r>
+              <a:rPr lang="en-SG" sz="1100" b="1" dirty="0" err="1">
+                <a:solidFill>
+                  <a:srgbClr val="800080"/>
+                </a:solidFill>
+                <a:latin typeface="Cascadia Mono" panose="020B0609020000020004" pitchFamily="49" charset="0"/>
+              </a:rPr>
+              <a:t>QuickGrid</a:t>
+            </a:r>
+            <a:r>
+              <a:rPr lang="en-SG" sz="1100" b="0" dirty="0">
+                <a:solidFill>
+                  <a:srgbClr val="000000"/>
+                </a:solidFill>
+                <a:latin typeface="Cascadia Mono" panose="020B0609020000020004" pitchFamily="49" charset="0"/>
+              </a:rPr>
+              <a:t> </a:t>
+            </a:r>
+            <a:r>
+              <a:rPr lang="en-SG" sz="1100" b="1" dirty="0">
+                <a:solidFill>
+                  <a:srgbClr val="800080"/>
+                </a:solidFill>
+                <a:latin typeface="Cascadia Mono" panose="020B0609020000020004" pitchFamily="49" charset="0"/>
+              </a:rPr>
+              <a:t>Items</a:t>
+            </a:r>
+            <a:r>
+              <a:rPr lang="en-SG" sz="1100" b="0" dirty="0">
+                <a:solidFill>
+                  <a:srgbClr val="0000FF"/>
+                </a:solidFill>
+                <a:latin typeface="Cascadia Mono" panose="020B0609020000020004" pitchFamily="49" charset="0"/>
+              </a:rPr>
+              <a:t>="</a:t>
+            </a:r>
+            <a:r>
+              <a:rPr lang="en-SG" sz="1100" b="0" dirty="0">
+                <a:solidFill>
+                  <a:srgbClr val="000000"/>
+                </a:solidFill>
+                <a:latin typeface="Cascadia Mono" panose="020B0609020000020004" pitchFamily="49" charset="0"/>
+              </a:rPr>
+              <a:t>@people</a:t>
+            </a:r>
+            <a:r>
+              <a:rPr lang="en-SG" sz="1100" b="0" dirty="0">
+                <a:solidFill>
+                  <a:srgbClr val="0000FF"/>
+                </a:solidFill>
+                <a:latin typeface="Cascadia Mono" panose="020B0609020000020004" pitchFamily="49" charset="0"/>
+              </a:rPr>
+              <a:t>"&gt;</a:t>
+            </a:r>
+            <a:endParaRPr lang="en-SG" sz="1100" b="0" dirty="0">
+              <a:solidFill>
+                <a:srgbClr val="000000"/>
+              </a:solidFill>
+              <a:latin typeface="Cascadia Mono" panose="020B0609020000020004" pitchFamily="49" charset="0"/>
+            </a:endParaRPr>
+          </a:p>
+          <a:p>
+            <a:r>
+              <a:rPr lang="en-SG" sz="1100" b="0" dirty="0">
+                <a:solidFill>
+                  <a:srgbClr val="000000"/>
+                </a:solidFill>
+                <a:latin typeface="Cascadia Mono" panose="020B0609020000020004" pitchFamily="49" charset="0"/>
+              </a:rPr>
+              <a:t>    </a:t>
+            </a:r>
+            <a:r>
+              <a:rPr lang="en-SG" sz="1100" b="0" dirty="0">
+                <a:solidFill>
+                  <a:srgbClr val="0000FF"/>
+                </a:solidFill>
+                <a:latin typeface="Cascadia Mono" panose="020B0609020000020004" pitchFamily="49" charset="0"/>
+              </a:rPr>
+              <a:t>&lt;</a:t>
+            </a:r>
+            <a:r>
+              <a:rPr lang="en-SG" sz="1100" b="1" dirty="0" err="1">
+                <a:solidFill>
+                  <a:srgbClr val="800080"/>
+                </a:solidFill>
+                <a:latin typeface="Cascadia Mono" panose="020B0609020000020004" pitchFamily="49" charset="0"/>
+              </a:rPr>
+              <a:t>PropertyColumn</a:t>
+            </a:r>
+            <a:r>
+              <a:rPr lang="en-SG" sz="1100" b="0" dirty="0">
+                <a:solidFill>
+                  <a:srgbClr val="000000"/>
+                </a:solidFill>
+                <a:latin typeface="Cascadia Mono" panose="020B0609020000020004" pitchFamily="49" charset="0"/>
+              </a:rPr>
+              <a:t> </a:t>
+            </a:r>
+            <a:r>
+              <a:rPr lang="en-SG" sz="1100" b="1" dirty="0">
+                <a:solidFill>
+                  <a:srgbClr val="800080"/>
+                </a:solidFill>
+                <a:latin typeface="Cascadia Mono" panose="020B0609020000020004" pitchFamily="49" charset="0"/>
+              </a:rPr>
+              <a:t>Property</a:t>
+            </a:r>
+            <a:r>
+              <a:rPr lang="en-SG" sz="1100" b="0" dirty="0">
+                <a:solidFill>
+                  <a:srgbClr val="0000FF"/>
+                </a:solidFill>
+                <a:latin typeface="Cascadia Mono" panose="020B0609020000020004" pitchFamily="49" charset="0"/>
+              </a:rPr>
+              <a:t>="</a:t>
+            </a:r>
+            <a:r>
+              <a:rPr lang="en-SG" sz="1100" b="0" dirty="0">
+                <a:solidFill>
+                  <a:srgbClr val="000000"/>
+                </a:solidFill>
+                <a:latin typeface="Cascadia Mono" panose="020B0609020000020004" pitchFamily="49" charset="0"/>
+              </a:rPr>
+              <a:t>@(p =&gt; </a:t>
+            </a:r>
+            <a:r>
+              <a:rPr lang="en-SG" sz="1100" b="0" dirty="0" err="1">
+                <a:solidFill>
+                  <a:srgbClr val="000000"/>
+                </a:solidFill>
+                <a:latin typeface="Cascadia Mono" panose="020B0609020000020004" pitchFamily="49" charset="0"/>
+              </a:rPr>
+              <a:t>p.PersonId</a:t>
+            </a:r>
+            <a:r>
+              <a:rPr lang="en-SG" sz="1100" b="0" dirty="0">
+                <a:solidFill>
+                  <a:srgbClr val="000000"/>
+                </a:solidFill>
+                <a:latin typeface="Cascadia Mono" panose="020B0609020000020004" pitchFamily="49" charset="0"/>
+              </a:rPr>
+              <a:t>)</a:t>
+            </a:r>
+            <a:r>
+              <a:rPr lang="en-SG" sz="1100" b="0" dirty="0">
+                <a:solidFill>
+                  <a:srgbClr val="0000FF"/>
+                </a:solidFill>
+                <a:latin typeface="Cascadia Mono" panose="020B0609020000020004" pitchFamily="49" charset="0"/>
+              </a:rPr>
+              <a:t>"</a:t>
+            </a:r>
+            <a:r>
+              <a:rPr lang="en-SG" sz="1100" b="0" dirty="0">
+                <a:solidFill>
+                  <a:srgbClr val="000000"/>
+                </a:solidFill>
+                <a:latin typeface="Cascadia Mono" panose="020B0609020000020004" pitchFamily="49" charset="0"/>
+              </a:rPr>
+              <a:t> </a:t>
+            </a:r>
+            <a:r>
+              <a:rPr lang="en-SG" sz="1100" b="1" dirty="0">
+                <a:solidFill>
+                  <a:srgbClr val="800080"/>
+                </a:solidFill>
+                <a:latin typeface="Cascadia Mono" panose="020B0609020000020004" pitchFamily="49" charset="0"/>
+              </a:rPr>
+              <a:t>Sortable</a:t>
+            </a:r>
+            <a:r>
+              <a:rPr lang="en-SG" sz="1100" b="0" dirty="0">
+                <a:solidFill>
+                  <a:srgbClr val="0000FF"/>
+                </a:solidFill>
+                <a:latin typeface="Cascadia Mono" panose="020B0609020000020004" pitchFamily="49" charset="0"/>
+              </a:rPr>
+              <a:t>="true" /&gt;</a:t>
+            </a:r>
+            <a:endParaRPr lang="en-SG" sz="1100" b="0" dirty="0">
+              <a:solidFill>
+                <a:srgbClr val="000000"/>
+              </a:solidFill>
+              <a:latin typeface="Cascadia Mono" panose="020B0609020000020004" pitchFamily="49" charset="0"/>
+            </a:endParaRPr>
+          </a:p>
+          <a:p>
+            <a:r>
+              <a:rPr lang="en-SG" sz="1100" b="0" dirty="0">
+                <a:solidFill>
+                  <a:srgbClr val="000000"/>
+                </a:solidFill>
+                <a:latin typeface="Cascadia Mono" panose="020B0609020000020004" pitchFamily="49" charset="0"/>
+              </a:rPr>
+              <a:t>    </a:t>
+            </a:r>
+            <a:r>
+              <a:rPr lang="en-SG" sz="1100" b="0" dirty="0">
+                <a:solidFill>
+                  <a:srgbClr val="0000FF"/>
+                </a:solidFill>
+                <a:latin typeface="Cascadia Mono" panose="020B0609020000020004" pitchFamily="49" charset="0"/>
+              </a:rPr>
+              <a:t>&lt;</a:t>
+            </a:r>
+            <a:r>
+              <a:rPr lang="en-SG" sz="1100" b="1" dirty="0" err="1">
+                <a:solidFill>
+                  <a:srgbClr val="800080"/>
+                </a:solidFill>
+                <a:latin typeface="Cascadia Mono" panose="020B0609020000020004" pitchFamily="49" charset="0"/>
+              </a:rPr>
+              <a:t>PropertyColumn</a:t>
+            </a:r>
+            <a:r>
+              <a:rPr lang="en-SG" sz="1100" b="0" dirty="0">
+                <a:solidFill>
+                  <a:srgbClr val="000000"/>
+                </a:solidFill>
+                <a:latin typeface="Cascadia Mono" panose="020B0609020000020004" pitchFamily="49" charset="0"/>
+              </a:rPr>
+              <a:t> </a:t>
+            </a:r>
+            <a:r>
+              <a:rPr lang="en-SG" sz="1100" b="1" dirty="0">
+                <a:solidFill>
+                  <a:srgbClr val="800080"/>
+                </a:solidFill>
+                <a:latin typeface="Cascadia Mono" panose="020B0609020000020004" pitchFamily="49" charset="0"/>
+              </a:rPr>
+              <a:t>Property</a:t>
+            </a:r>
+            <a:r>
+              <a:rPr lang="en-SG" sz="1100" b="0" dirty="0">
+                <a:solidFill>
+                  <a:srgbClr val="0000FF"/>
+                </a:solidFill>
+                <a:latin typeface="Cascadia Mono" panose="020B0609020000020004" pitchFamily="49" charset="0"/>
+              </a:rPr>
+              <a:t>="</a:t>
+            </a:r>
+            <a:r>
+              <a:rPr lang="en-SG" sz="1100" b="0" dirty="0">
+                <a:solidFill>
+                  <a:srgbClr val="000000"/>
+                </a:solidFill>
+                <a:latin typeface="Cascadia Mono" panose="020B0609020000020004" pitchFamily="49" charset="0"/>
+              </a:rPr>
+              <a:t>@(p =&gt; </a:t>
+            </a:r>
+            <a:r>
+              <a:rPr lang="en-SG" sz="1100" b="0" dirty="0" err="1">
+                <a:solidFill>
+                  <a:srgbClr val="000000"/>
+                </a:solidFill>
+                <a:latin typeface="Cascadia Mono" panose="020B0609020000020004" pitchFamily="49" charset="0"/>
+              </a:rPr>
+              <a:t>p.Name</a:t>
+            </a:r>
+            <a:r>
+              <a:rPr lang="en-SG" sz="1100" b="0" dirty="0">
+                <a:solidFill>
+                  <a:srgbClr val="000000"/>
+                </a:solidFill>
+                <a:latin typeface="Cascadia Mono" panose="020B0609020000020004" pitchFamily="49" charset="0"/>
+              </a:rPr>
+              <a:t>)</a:t>
+            </a:r>
+            <a:r>
+              <a:rPr lang="en-SG" sz="1100" b="0" dirty="0">
+                <a:solidFill>
+                  <a:srgbClr val="0000FF"/>
+                </a:solidFill>
+                <a:latin typeface="Cascadia Mono" panose="020B0609020000020004" pitchFamily="49" charset="0"/>
+              </a:rPr>
+              <a:t>"</a:t>
+            </a:r>
+            <a:r>
+              <a:rPr lang="en-SG" sz="1100" b="0" dirty="0">
+                <a:solidFill>
+                  <a:srgbClr val="000000"/>
+                </a:solidFill>
+                <a:latin typeface="Cascadia Mono" panose="020B0609020000020004" pitchFamily="49" charset="0"/>
+              </a:rPr>
+              <a:t> </a:t>
+            </a:r>
+            <a:r>
+              <a:rPr lang="en-SG" sz="1100" b="1" dirty="0">
+                <a:solidFill>
+                  <a:srgbClr val="800080"/>
+                </a:solidFill>
+                <a:latin typeface="Cascadia Mono" panose="020B0609020000020004" pitchFamily="49" charset="0"/>
+              </a:rPr>
+              <a:t>Sortable</a:t>
+            </a:r>
+            <a:r>
+              <a:rPr lang="en-SG" sz="1100" b="0" dirty="0">
+                <a:solidFill>
+                  <a:srgbClr val="0000FF"/>
+                </a:solidFill>
+                <a:latin typeface="Cascadia Mono" panose="020B0609020000020004" pitchFamily="49" charset="0"/>
+              </a:rPr>
+              <a:t>="true" /&gt;</a:t>
+            </a:r>
+            <a:endParaRPr lang="en-SG" sz="1100" b="0" dirty="0">
+              <a:solidFill>
+                <a:srgbClr val="000000"/>
+              </a:solidFill>
+              <a:latin typeface="Cascadia Mono" panose="020B0609020000020004" pitchFamily="49" charset="0"/>
+            </a:endParaRPr>
+          </a:p>
+          <a:p>
+            <a:r>
+              <a:rPr lang="en-SG" sz="1100" b="0" dirty="0">
+                <a:solidFill>
+                  <a:srgbClr val="000000"/>
+                </a:solidFill>
+                <a:latin typeface="Cascadia Mono" panose="020B0609020000020004" pitchFamily="49" charset="0"/>
+              </a:rPr>
+              <a:t>    </a:t>
+            </a:r>
+            <a:r>
+              <a:rPr lang="en-SG" sz="1100" b="0" dirty="0">
+                <a:solidFill>
+                  <a:srgbClr val="0000FF"/>
+                </a:solidFill>
+                <a:latin typeface="Cascadia Mono" panose="020B0609020000020004" pitchFamily="49" charset="0"/>
+              </a:rPr>
+              <a:t>&lt;</a:t>
+            </a:r>
+            <a:r>
+              <a:rPr lang="en-SG" sz="1100" b="1" dirty="0" err="1">
+                <a:solidFill>
+                  <a:srgbClr val="800080"/>
+                </a:solidFill>
+                <a:latin typeface="Cascadia Mono" panose="020B0609020000020004" pitchFamily="49" charset="0"/>
+              </a:rPr>
+              <a:t>PropertyColumn</a:t>
+            </a:r>
+            <a:r>
+              <a:rPr lang="en-SG" sz="1100" b="0" dirty="0">
+                <a:solidFill>
+                  <a:srgbClr val="000000"/>
+                </a:solidFill>
+                <a:latin typeface="Cascadia Mono" panose="020B0609020000020004" pitchFamily="49" charset="0"/>
+              </a:rPr>
+              <a:t> </a:t>
+            </a:r>
+            <a:r>
+              <a:rPr lang="en-SG" sz="1100" b="1" dirty="0">
+                <a:solidFill>
+                  <a:srgbClr val="800080"/>
+                </a:solidFill>
+                <a:latin typeface="Cascadia Mono" panose="020B0609020000020004" pitchFamily="49" charset="0"/>
+              </a:rPr>
+              <a:t>Property</a:t>
+            </a:r>
+            <a:r>
+              <a:rPr lang="en-SG" sz="1100" b="0" dirty="0">
+                <a:solidFill>
+                  <a:srgbClr val="0000FF"/>
+                </a:solidFill>
+                <a:latin typeface="Cascadia Mono" panose="020B0609020000020004" pitchFamily="49" charset="0"/>
+              </a:rPr>
+              <a:t>="</a:t>
+            </a:r>
+            <a:r>
+              <a:rPr lang="en-SG" sz="1100" b="0" dirty="0">
+                <a:solidFill>
+                  <a:srgbClr val="000000"/>
+                </a:solidFill>
+                <a:latin typeface="Cascadia Mono" panose="020B0609020000020004" pitchFamily="49" charset="0"/>
+              </a:rPr>
+              <a:t>@(p =&gt; </a:t>
+            </a:r>
+            <a:r>
+              <a:rPr lang="en-SG" sz="1100" b="0" dirty="0" err="1">
+                <a:solidFill>
+                  <a:srgbClr val="000000"/>
+                </a:solidFill>
+                <a:latin typeface="Cascadia Mono" panose="020B0609020000020004" pitchFamily="49" charset="0"/>
+              </a:rPr>
+              <a:t>p.PromotionDate</a:t>
+            </a:r>
+            <a:r>
+              <a:rPr lang="en-SG" sz="1100" b="0" dirty="0">
+                <a:solidFill>
+                  <a:srgbClr val="000000"/>
+                </a:solidFill>
+                <a:latin typeface="Cascadia Mono" panose="020B0609020000020004" pitchFamily="49" charset="0"/>
+              </a:rPr>
+              <a:t>)</a:t>
+            </a:r>
+            <a:r>
+              <a:rPr lang="en-SG" sz="1100" b="0" dirty="0">
+                <a:solidFill>
+                  <a:srgbClr val="0000FF"/>
+                </a:solidFill>
+                <a:latin typeface="Cascadia Mono" panose="020B0609020000020004" pitchFamily="49" charset="0"/>
+              </a:rPr>
+              <a:t>"</a:t>
+            </a:r>
+            <a:r>
+              <a:rPr lang="en-SG" sz="1100" b="0" dirty="0">
+                <a:solidFill>
+                  <a:srgbClr val="000000"/>
+                </a:solidFill>
+                <a:latin typeface="Cascadia Mono" panose="020B0609020000020004" pitchFamily="49" charset="0"/>
+              </a:rPr>
+              <a:t> </a:t>
+            </a:r>
+            <a:r>
+              <a:rPr lang="en-SG" sz="1100" b="1" dirty="0">
+                <a:solidFill>
+                  <a:srgbClr val="800080"/>
+                </a:solidFill>
+                <a:latin typeface="Cascadia Mono" panose="020B0609020000020004" pitchFamily="49" charset="0"/>
+              </a:rPr>
+              <a:t>Format</a:t>
+            </a:r>
+            <a:r>
+              <a:rPr lang="en-SG" sz="1100" b="0" dirty="0">
+                <a:solidFill>
+                  <a:srgbClr val="0000FF"/>
+                </a:solidFill>
+                <a:latin typeface="Cascadia Mono" panose="020B0609020000020004" pitchFamily="49" charset="0"/>
+              </a:rPr>
+              <a:t>="</a:t>
+            </a:r>
+            <a:r>
+              <a:rPr lang="en-SG" sz="1100" b="0" dirty="0" err="1">
+                <a:solidFill>
+                  <a:srgbClr val="0000FF"/>
+                </a:solidFill>
+                <a:latin typeface="Cascadia Mono" panose="020B0609020000020004" pitchFamily="49" charset="0"/>
+              </a:rPr>
+              <a:t>yyyy</a:t>
+            </a:r>
+            <a:r>
+              <a:rPr lang="en-SG" sz="1100" b="0" dirty="0">
+                <a:solidFill>
+                  <a:srgbClr val="0000FF"/>
+                </a:solidFill>
+                <a:latin typeface="Cascadia Mono" panose="020B0609020000020004" pitchFamily="49" charset="0"/>
+              </a:rPr>
+              <a:t>-MM-dd"</a:t>
+            </a:r>
+            <a:r>
+              <a:rPr lang="en-SG" sz="1100" b="0" dirty="0">
+                <a:solidFill>
+                  <a:srgbClr val="000000"/>
+                </a:solidFill>
+                <a:latin typeface="Cascadia Mono" panose="020B0609020000020004" pitchFamily="49" charset="0"/>
+              </a:rPr>
+              <a:t> </a:t>
+            </a:r>
+            <a:r>
+              <a:rPr lang="en-SG" sz="1100" b="1" dirty="0">
+                <a:solidFill>
+                  <a:srgbClr val="800080"/>
+                </a:solidFill>
+                <a:latin typeface="Cascadia Mono" panose="020B0609020000020004" pitchFamily="49" charset="0"/>
+              </a:rPr>
+              <a:t>Sortable</a:t>
+            </a:r>
+            <a:r>
+              <a:rPr lang="en-SG" sz="1100" b="0" dirty="0">
+                <a:solidFill>
+                  <a:srgbClr val="0000FF"/>
+                </a:solidFill>
+                <a:latin typeface="Cascadia Mono" panose="020B0609020000020004" pitchFamily="49" charset="0"/>
+              </a:rPr>
+              <a:t>="true" /&gt;</a:t>
+            </a:r>
+            <a:endParaRPr lang="en-SG" sz="1100" b="0" dirty="0">
+              <a:solidFill>
+                <a:srgbClr val="000000"/>
+              </a:solidFill>
+              <a:latin typeface="Cascadia Mono" panose="020B0609020000020004" pitchFamily="49" charset="0"/>
+            </a:endParaRPr>
+          </a:p>
+          <a:p>
+            <a:r>
+              <a:rPr lang="en-SG" sz="1100" b="0" dirty="0">
+                <a:solidFill>
+                  <a:srgbClr val="0000FF"/>
+                </a:solidFill>
+                <a:latin typeface="Cascadia Mono" panose="020B0609020000020004" pitchFamily="49" charset="0"/>
+              </a:rPr>
+              <a:t>&lt;/</a:t>
+            </a:r>
+            <a:r>
+              <a:rPr lang="en-SG" sz="1100" b="1" dirty="0" err="1">
+                <a:solidFill>
+                  <a:srgbClr val="800080"/>
+                </a:solidFill>
+                <a:latin typeface="Cascadia Mono" panose="020B0609020000020004" pitchFamily="49" charset="0"/>
+              </a:rPr>
+              <a:t>QuickGrid</a:t>
+            </a:r>
+            <a:r>
+              <a:rPr lang="en-SG" sz="1100" b="0" dirty="0">
+                <a:solidFill>
+                  <a:srgbClr val="0000FF"/>
+                </a:solidFill>
+                <a:latin typeface="Cascadia Mono" panose="020B0609020000020004" pitchFamily="49" charset="0"/>
+              </a:rPr>
+              <a:t>&gt;</a:t>
+            </a:r>
+            <a:endParaRPr lang="en-SG" sz="1100" dirty="0"/>
+          </a:p>
+        </p:txBody>
+      </p:sp>
     </p:spTree>
     <p:extLst>
       <p:ext uri="{BB962C8B-B14F-4D97-AF65-F5344CB8AC3E}">
@@ -22067,7 +23453,7 @@
 </p:sld>
 </file>
 
-<file path=ppt/slides/slide18.xml><?xml version="1.0" encoding="utf-8"?>
+<file path=ppt/slides/slide19.xml><?xml version="1.0" encoding="utf-8"?>
 <p:sld xmlns:a="http://schemas.openxmlformats.org/drawingml/2006/main" xmlns:r="http://schemas.openxmlformats.org/officeDocument/2006/relationships" xmlns:p="http://schemas.openxmlformats.org/presentationml/2006/main">
   <p:cSld>
     <p:spTree>
@@ -23568,438 +24954,6 @@
     <p:extLst>
       <p:ext uri="{BB962C8B-B14F-4D97-AF65-F5344CB8AC3E}">
         <p14:creationId xmlns:p14="http://schemas.microsoft.com/office/powerpoint/2010/main" val="100851232"/>
-      </p:ext>
-    </p:extLst>
-  </p:cSld>
-  <p:clrMapOvr>
-    <a:masterClrMapping/>
-  </p:clrMapOvr>
-</p:sld>
-</file>
-
-<file path=ppt/slides/slide19.xml><?xml version="1.0" encoding="utf-8"?>
-<p:sld xmlns:a="http://schemas.openxmlformats.org/drawingml/2006/main" xmlns:r="http://schemas.openxmlformats.org/officeDocument/2006/relationships" xmlns:p="http://schemas.openxmlformats.org/presentationml/2006/main">
-  <p:cSld>
-    <p:spTree>
-      <p:nvGrpSpPr>
-        <p:cNvPr id="1" name=""/>
-        <p:cNvGrpSpPr/>
-        <p:nvPr/>
-      </p:nvGrpSpPr>
-      <p:grpSpPr>
-        <a:xfrm>
-          <a:off x="0" y="0"/>
-          <a:ext cx="0" cy="0"/>
-          <a:chOff x="0" y="0"/>
-          <a:chExt cx="0" cy="0"/>
-        </a:xfrm>
-      </p:grpSpPr>
-      <p:sp>
-        <p:nvSpPr>
-          <p:cNvPr id="2" name="Title 1">
-            <a:extLst>
-              <a:ext uri="{FF2B5EF4-FFF2-40B4-BE49-F238E27FC236}">
-                <a16:creationId xmlns:a16="http://schemas.microsoft.com/office/drawing/2014/main" id="{9A190264-F9F3-A37B-5C6C-39776644A968}"/>
-              </a:ext>
-            </a:extLst>
-          </p:cNvPr>
-          <p:cNvSpPr>
-            <a:spLocks noGrp="1"/>
-          </p:cNvSpPr>
-          <p:nvPr>
-            <p:ph type="title"/>
-          </p:nvPr>
-        </p:nvSpPr>
-        <p:spPr/>
-        <p:txBody>
-          <a:bodyPr/>
-          <a:lstStyle/>
-          <a:p>
-            <a:r>
-              <a:rPr lang="en-US" altLang="zh-CN" dirty="0"/>
-              <a:t>New Features</a:t>
-            </a:r>
-            <a:endParaRPr lang="en-SG" dirty="0"/>
-          </a:p>
-        </p:txBody>
-      </p:sp>
-      <p:sp>
-        <p:nvSpPr>
-          <p:cNvPr id="3" name="Content Placeholder 2">
-            <a:extLst>
-              <a:ext uri="{FF2B5EF4-FFF2-40B4-BE49-F238E27FC236}">
-                <a16:creationId xmlns:a16="http://schemas.microsoft.com/office/drawing/2014/main" id="{3C4AFF9F-3802-7CE3-A529-E503EB704FFD}"/>
-              </a:ext>
-            </a:extLst>
-          </p:cNvPr>
-          <p:cNvSpPr>
-            <a:spLocks noGrp="1"/>
-          </p:cNvSpPr>
-          <p:nvPr>
-            <p:ph idx="1"/>
-          </p:nvPr>
-        </p:nvSpPr>
-        <p:spPr>
-          <a:xfrm>
-            <a:off x="691078" y="3000651"/>
-            <a:ext cx="4839710" cy="1935333"/>
-          </a:xfrm>
-        </p:spPr>
-        <p:txBody>
-          <a:bodyPr>
-            <a:normAutofit/>
-          </a:bodyPr>
-          <a:lstStyle/>
-          <a:p>
-            <a:r>
-              <a:rPr lang="en-SG" sz="1200" dirty="0"/>
-              <a:t>Webcil files use a standard </a:t>
-            </a:r>
-            <a:r>
-              <a:rPr lang="en-SG" sz="1200" dirty="0" err="1"/>
-              <a:t>WebAssembly</a:t>
-            </a:r>
-            <a:r>
-              <a:rPr lang="en-SG" sz="1200" dirty="0"/>
-              <a:t> wrapper, where the assemblies are deployed as </a:t>
-            </a:r>
-            <a:r>
-              <a:rPr lang="en-SG" sz="1200" dirty="0" err="1"/>
-              <a:t>WebAssembly</a:t>
-            </a:r>
-            <a:r>
-              <a:rPr lang="en-SG" sz="1200" dirty="0"/>
-              <a:t> files that use the standard .</a:t>
-            </a:r>
-            <a:r>
-              <a:rPr lang="en-SG" sz="1200" b="1" dirty="0" err="1"/>
-              <a:t>wasm</a:t>
-            </a:r>
-            <a:r>
-              <a:rPr lang="en-SG" sz="1200" b="1" dirty="0"/>
-              <a:t> file </a:t>
-            </a:r>
-            <a:r>
-              <a:rPr lang="en-SG" sz="1200" dirty="0"/>
-              <a:t>extension instead of </a:t>
-            </a:r>
-            <a:r>
-              <a:rPr lang="en-SG" sz="1200" b="1" dirty="0"/>
-              <a:t>.</a:t>
-            </a:r>
-            <a:r>
-              <a:rPr lang="en-SG" sz="1200" b="1" dirty="0" err="1"/>
-              <a:t>dll</a:t>
-            </a:r>
-            <a:r>
-              <a:rPr lang="en-SG" sz="1200" b="1" dirty="0"/>
-              <a:t> file</a:t>
-            </a:r>
-            <a:r>
-              <a:rPr lang="en-SG" sz="1200" dirty="0"/>
-              <a:t>.</a:t>
-            </a:r>
-          </a:p>
-          <a:p>
-            <a:r>
-              <a:rPr lang="en-SG" sz="1200" dirty="0"/>
-              <a:t>For </a:t>
-            </a:r>
-            <a:r>
-              <a:rPr lang="en-SG" sz="1200" dirty="0" err="1"/>
-              <a:t>Blazor</a:t>
-            </a:r>
-            <a:r>
-              <a:rPr lang="en-SG" sz="1200" dirty="0"/>
-              <a:t> </a:t>
-            </a:r>
-            <a:r>
-              <a:rPr lang="en-SG" sz="1200" dirty="0" err="1"/>
-              <a:t>WebAssembly</a:t>
-            </a:r>
-            <a:r>
-              <a:rPr lang="en-SG" sz="1200" dirty="0"/>
-              <a:t>, output at </a:t>
-            </a:r>
-            <a:r>
-              <a:rPr lang="en-SG" sz="1200" b="1" dirty="0"/>
-              <a:t>{Project}.\bin\\{Debug or Release }\net8.0\</a:t>
-            </a:r>
-            <a:r>
-              <a:rPr lang="en-SG" sz="1200" b="1" dirty="0" err="1"/>
-              <a:t>wwwroot</a:t>
-            </a:r>
-            <a:r>
-              <a:rPr lang="en-SG" sz="1200" b="1" dirty="0"/>
-              <a:t>\_framework</a:t>
-            </a:r>
-          </a:p>
-          <a:p>
-            <a:r>
-              <a:rPr lang="en-SG" sz="1200" dirty="0"/>
-              <a:t>For </a:t>
-            </a:r>
-            <a:r>
-              <a:rPr lang="en-SG" sz="1200" dirty="0" err="1"/>
-              <a:t>Blazor</a:t>
-            </a:r>
-            <a:r>
-              <a:rPr lang="en-SG" sz="1200" dirty="0"/>
-              <a:t> Web App, output at </a:t>
-            </a:r>
-            <a:r>
-              <a:rPr lang="en-SG" sz="1200" b="1" dirty="0"/>
-              <a:t>{Project}.Client\bin\{Debug or Release }\net8.0\</a:t>
-            </a:r>
-            <a:r>
-              <a:rPr lang="en-SG" sz="1200" b="1" dirty="0" err="1"/>
-              <a:t>wwwroot</a:t>
-            </a:r>
-            <a:r>
-              <a:rPr lang="en-SG" sz="1200" b="1" dirty="0"/>
-              <a:t>\_framework</a:t>
-            </a:r>
-          </a:p>
-        </p:txBody>
-      </p:sp>
-      <p:pic>
-        <p:nvPicPr>
-          <p:cNvPr id="10" name="Picture 9">
-            <a:extLst>
-              <a:ext uri="{FF2B5EF4-FFF2-40B4-BE49-F238E27FC236}">
-                <a16:creationId xmlns:a16="http://schemas.microsoft.com/office/drawing/2014/main" id="{8569265C-3C51-0443-1675-284EC1D3A748}"/>
-              </a:ext>
-            </a:extLst>
-          </p:cNvPr>
-          <p:cNvPicPr>
-            <a:picLocks noChangeAspect="1"/>
-          </p:cNvPicPr>
-          <p:nvPr/>
-        </p:nvPicPr>
-        <p:blipFill>
-          <a:blip r:embed="rId2"/>
-          <a:stretch>
-            <a:fillRect/>
-          </a:stretch>
-        </p:blipFill>
-        <p:spPr>
-          <a:xfrm>
-            <a:off x="6020723" y="1699934"/>
-            <a:ext cx="2648320" cy="3991532"/>
-          </a:xfrm>
-          <a:prstGeom prst="rect">
-            <a:avLst/>
-          </a:prstGeom>
-        </p:spPr>
-      </p:pic>
-      <p:pic>
-        <p:nvPicPr>
-          <p:cNvPr id="12" name="Picture 11">
-            <a:extLst>
-              <a:ext uri="{FF2B5EF4-FFF2-40B4-BE49-F238E27FC236}">
-                <a16:creationId xmlns:a16="http://schemas.microsoft.com/office/drawing/2014/main" id="{FE2B773D-B27B-D075-420B-6FA2F53B7411}"/>
-              </a:ext>
-            </a:extLst>
-          </p:cNvPr>
-          <p:cNvPicPr>
-            <a:picLocks noChangeAspect="1"/>
-          </p:cNvPicPr>
-          <p:nvPr/>
-        </p:nvPicPr>
-        <p:blipFill>
-          <a:blip r:embed="rId3"/>
-          <a:stretch>
-            <a:fillRect/>
-          </a:stretch>
-        </p:blipFill>
-        <p:spPr>
-          <a:xfrm>
-            <a:off x="9247756" y="1626095"/>
-            <a:ext cx="2905530" cy="4505954"/>
-          </a:xfrm>
-          <a:prstGeom prst="rect">
-            <a:avLst/>
-          </a:prstGeom>
-        </p:spPr>
-      </p:pic>
-      <p:sp>
-        <p:nvSpPr>
-          <p:cNvPr id="14" name="TextBox 13">
-            <a:extLst>
-              <a:ext uri="{FF2B5EF4-FFF2-40B4-BE49-F238E27FC236}">
-                <a16:creationId xmlns:a16="http://schemas.microsoft.com/office/drawing/2014/main" id="{696D6C23-F685-6E47-6B37-EA47D158AEC7}"/>
-              </a:ext>
-            </a:extLst>
-          </p:cNvPr>
-          <p:cNvSpPr txBox="1"/>
-          <p:nvPr/>
-        </p:nvSpPr>
-        <p:spPr>
-          <a:xfrm>
-            <a:off x="6767743" y="6285937"/>
-            <a:ext cx="973584" cy="338554"/>
-          </a:xfrm>
-          <a:prstGeom prst="rect">
-            <a:avLst/>
-          </a:prstGeom>
-          <a:noFill/>
-        </p:spPr>
-        <p:txBody>
-          <a:bodyPr wrap="square">
-            <a:spAutoFit/>
-          </a:bodyPr>
-          <a:lstStyle/>
-          <a:p>
-            <a:r>
-              <a:rPr lang="en-SG" sz="1600" b="1" dirty="0" err="1">
-                <a:solidFill>
-                  <a:srgbClr val="FF0000"/>
-                </a:solidFill>
-              </a:rPr>
-              <a:t>.net</a:t>
-            </a:r>
-            <a:r>
-              <a:rPr lang="en-SG" sz="1600" b="1" dirty="0">
-                <a:solidFill>
-                  <a:srgbClr val="FF0000"/>
-                </a:solidFill>
-              </a:rPr>
-              <a:t> 6.0</a:t>
-            </a:r>
-          </a:p>
-        </p:txBody>
-      </p:sp>
-      <p:sp>
-        <p:nvSpPr>
-          <p:cNvPr id="15" name="TextBox 14">
-            <a:extLst>
-              <a:ext uri="{FF2B5EF4-FFF2-40B4-BE49-F238E27FC236}">
-                <a16:creationId xmlns:a16="http://schemas.microsoft.com/office/drawing/2014/main" id="{10D2B828-1AB9-CFE2-C0B9-249270A2A664}"/>
-              </a:ext>
-            </a:extLst>
-          </p:cNvPr>
-          <p:cNvSpPr txBox="1"/>
-          <p:nvPr/>
-        </p:nvSpPr>
-        <p:spPr>
-          <a:xfrm>
-            <a:off x="10045082" y="6285937"/>
-            <a:ext cx="973584" cy="338554"/>
-          </a:xfrm>
-          <a:prstGeom prst="rect">
-            <a:avLst/>
-          </a:prstGeom>
-          <a:noFill/>
-        </p:spPr>
-        <p:txBody>
-          <a:bodyPr wrap="square">
-            <a:spAutoFit/>
-          </a:bodyPr>
-          <a:lstStyle/>
-          <a:p>
-            <a:r>
-              <a:rPr lang="en-SG" sz="1600" b="1" dirty="0" err="1">
-                <a:solidFill>
-                  <a:srgbClr val="FF0000"/>
-                </a:solidFill>
-              </a:rPr>
-              <a:t>.net</a:t>
-            </a:r>
-            <a:r>
-              <a:rPr lang="en-SG" sz="1600" b="1" dirty="0">
-                <a:solidFill>
-                  <a:srgbClr val="FF0000"/>
-                </a:solidFill>
-              </a:rPr>
-              <a:t> 8.0</a:t>
-            </a:r>
-          </a:p>
-        </p:txBody>
-      </p:sp>
-      <p:sp>
-        <p:nvSpPr>
-          <p:cNvPr id="4" name="TextBox 3">
-            <a:extLst>
-              <a:ext uri="{FF2B5EF4-FFF2-40B4-BE49-F238E27FC236}">
-                <a16:creationId xmlns:a16="http://schemas.microsoft.com/office/drawing/2014/main" id="{44C70649-CFCC-6D73-FF84-A2B0D8126CDD}"/>
-              </a:ext>
-            </a:extLst>
-          </p:cNvPr>
-          <p:cNvSpPr txBox="1"/>
-          <p:nvPr/>
-        </p:nvSpPr>
-        <p:spPr>
-          <a:xfrm>
-            <a:off x="691078" y="2354321"/>
-            <a:ext cx="3572279" cy="369332"/>
-          </a:xfrm>
-          <a:prstGeom prst="rect">
-            <a:avLst/>
-          </a:prstGeom>
-          <a:noFill/>
-        </p:spPr>
-        <p:txBody>
-          <a:bodyPr wrap="square">
-            <a:spAutoFit/>
-          </a:bodyPr>
-          <a:lstStyle/>
-          <a:p>
-            <a:r>
-              <a:rPr lang="en-SG" i="0" dirty="0">
-                <a:solidFill>
-                  <a:srgbClr val="161616"/>
-                </a:solidFill>
-                <a:effectLst/>
-                <a:latin typeface="Segoe UI" panose="020B0502040204020203" pitchFamily="34" charset="0"/>
-              </a:rPr>
-              <a:t>Webcil packaging</a:t>
-            </a:r>
-            <a:endParaRPr lang="en-SG" dirty="0"/>
-          </a:p>
-        </p:txBody>
-      </p:sp>
-      <p:sp>
-        <p:nvSpPr>
-          <p:cNvPr id="6" name="TextBox 5">
-            <a:extLst>
-              <a:ext uri="{FF2B5EF4-FFF2-40B4-BE49-F238E27FC236}">
-                <a16:creationId xmlns:a16="http://schemas.microsoft.com/office/drawing/2014/main" id="{4887F504-FE7E-1DB8-2984-3352FC756BC3}"/>
-              </a:ext>
-            </a:extLst>
-          </p:cNvPr>
-          <p:cNvSpPr txBox="1"/>
-          <p:nvPr/>
-        </p:nvSpPr>
-        <p:spPr>
-          <a:xfrm>
-            <a:off x="569652" y="6246705"/>
-            <a:ext cx="5526348" cy="276999"/>
-          </a:xfrm>
-          <a:prstGeom prst="rect">
-            <a:avLst/>
-          </a:prstGeom>
-          <a:noFill/>
-        </p:spPr>
-        <p:txBody>
-          <a:bodyPr wrap="square">
-            <a:spAutoFit/>
-          </a:bodyPr>
-          <a:lstStyle/>
-          <a:p>
-            <a:r>
-              <a:rPr lang="en-SG" sz="1200" dirty="0">
-                <a:hlinkClick r:id="rId4"/>
-              </a:rPr>
-              <a:t>https://github.com/dotnet/runtime/blob/main/docs/design/mono/webcil.md</a:t>
-            </a:r>
-            <a:endParaRPr lang="en-SG" sz="1200" dirty="0"/>
-          </a:p>
-        </p:txBody>
-      </p:sp>
-    </p:spTree>
-    <p:extLst>
-      <p:ext uri="{BB962C8B-B14F-4D97-AF65-F5344CB8AC3E}">
-        <p14:creationId xmlns:p14="http://schemas.microsoft.com/office/powerpoint/2010/main" val="1153229066"/>
       </p:ext>
     </p:extLst>
   </p:cSld>
@@ -26507,6 +27461,438 @@
           <p:cNvPr id="2" name="Title 1">
             <a:extLst>
               <a:ext uri="{FF2B5EF4-FFF2-40B4-BE49-F238E27FC236}">
+                <a16:creationId xmlns:a16="http://schemas.microsoft.com/office/drawing/2014/main" id="{9A190264-F9F3-A37B-5C6C-39776644A968}"/>
+              </a:ext>
+            </a:extLst>
+          </p:cNvPr>
+          <p:cNvSpPr>
+            <a:spLocks noGrp="1"/>
+          </p:cNvSpPr>
+          <p:nvPr>
+            <p:ph type="title"/>
+          </p:nvPr>
+        </p:nvSpPr>
+        <p:spPr/>
+        <p:txBody>
+          <a:bodyPr/>
+          <a:lstStyle/>
+          <a:p>
+            <a:r>
+              <a:rPr lang="en-US" altLang="zh-CN" dirty="0"/>
+              <a:t>New Features</a:t>
+            </a:r>
+            <a:endParaRPr lang="en-SG" dirty="0"/>
+          </a:p>
+        </p:txBody>
+      </p:sp>
+      <p:sp>
+        <p:nvSpPr>
+          <p:cNvPr id="3" name="Content Placeholder 2">
+            <a:extLst>
+              <a:ext uri="{FF2B5EF4-FFF2-40B4-BE49-F238E27FC236}">
+                <a16:creationId xmlns:a16="http://schemas.microsoft.com/office/drawing/2014/main" id="{3C4AFF9F-3802-7CE3-A529-E503EB704FFD}"/>
+              </a:ext>
+            </a:extLst>
+          </p:cNvPr>
+          <p:cNvSpPr>
+            <a:spLocks noGrp="1"/>
+          </p:cNvSpPr>
+          <p:nvPr>
+            <p:ph idx="1"/>
+          </p:nvPr>
+        </p:nvSpPr>
+        <p:spPr>
+          <a:xfrm>
+            <a:off x="691078" y="3000651"/>
+            <a:ext cx="4839710" cy="1935333"/>
+          </a:xfrm>
+        </p:spPr>
+        <p:txBody>
+          <a:bodyPr>
+            <a:normAutofit/>
+          </a:bodyPr>
+          <a:lstStyle/>
+          <a:p>
+            <a:r>
+              <a:rPr lang="en-SG" sz="1200" dirty="0"/>
+              <a:t>Webcil files use a standard </a:t>
+            </a:r>
+            <a:r>
+              <a:rPr lang="en-SG" sz="1200" dirty="0" err="1"/>
+              <a:t>WebAssembly</a:t>
+            </a:r>
+            <a:r>
+              <a:rPr lang="en-SG" sz="1200" dirty="0"/>
+              <a:t> wrapper, where the assemblies are deployed as </a:t>
+            </a:r>
+            <a:r>
+              <a:rPr lang="en-SG" sz="1200" dirty="0" err="1"/>
+              <a:t>WebAssembly</a:t>
+            </a:r>
+            <a:r>
+              <a:rPr lang="en-SG" sz="1200" dirty="0"/>
+              <a:t> files that use the standard .</a:t>
+            </a:r>
+            <a:r>
+              <a:rPr lang="en-SG" sz="1200" b="1" dirty="0" err="1"/>
+              <a:t>wasm</a:t>
+            </a:r>
+            <a:r>
+              <a:rPr lang="en-SG" sz="1200" b="1" dirty="0"/>
+              <a:t> file </a:t>
+            </a:r>
+            <a:r>
+              <a:rPr lang="en-SG" sz="1200" dirty="0"/>
+              <a:t>extension instead of </a:t>
+            </a:r>
+            <a:r>
+              <a:rPr lang="en-SG" sz="1200" b="1" dirty="0"/>
+              <a:t>.</a:t>
+            </a:r>
+            <a:r>
+              <a:rPr lang="en-SG" sz="1200" b="1" dirty="0" err="1"/>
+              <a:t>dll</a:t>
+            </a:r>
+            <a:r>
+              <a:rPr lang="en-SG" sz="1200" b="1" dirty="0"/>
+              <a:t> file</a:t>
+            </a:r>
+            <a:r>
+              <a:rPr lang="en-SG" sz="1200" dirty="0"/>
+              <a:t>.</a:t>
+            </a:r>
+          </a:p>
+          <a:p>
+            <a:r>
+              <a:rPr lang="en-SG" sz="1200" dirty="0"/>
+              <a:t>For </a:t>
+            </a:r>
+            <a:r>
+              <a:rPr lang="en-SG" sz="1200" dirty="0" err="1"/>
+              <a:t>Blazor</a:t>
+            </a:r>
+            <a:r>
+              <a:rPr lang="en-SG" sz="1200" dirty="0"/>
+              <a:t> </a:t>
+            </a:r>
+            <a:r>
+              <a:rPr lang="en-SG" sz="1200" dirty="0" err="1"/>
+              <a:t>WebAssembly</a:t>
+            </a:r>
+            <a:r>
+              <a:rPr lang="en-SG" sz="1200" dirty="0"/>
+              <a:t>, output at </a:t>
+            </a:r>
+            <a:r>
+              <a:rPr lang="en-SG" sz="1200" b="1" dirty="0"/>
+              <a:t>{Project}.\bin\\{Debug or Release }\net8.0\</a:t>
+            </a:r>
+            <a:r>
+              <a:rPr lang="en-SG" sz="1200" b="1" dirty="0" err="1"/>
+              <a:t>wwwroot</a:t>
+            </a:r>
+            <a:r>
+              <a:rPr lang="en-SG" sz="1200" b="1" dirty="0"/>
+              <a:t>\_framework</a:t>
+            </a:r>
+          </a:p>
+          <a:p>
+            <a:r>
+              <a:rPr lang="en-SG" sz="1200" dirty="0"/>
+              <a:t>For </a:t>
+            </a:r>
+            <a:r>
+              <a:rPr lang="en-SG" sz="1200" dirty="0" err="1"/>
+              <a:t>Blazor</a:t>
+            </a:r>
+            <a:r>
+              <a:rPr lang="en-SG" sz="1200" dirty="0"/>
+              <a:t> Web App, output at </a:t>
+            </a:r>
+            <a:r>
+              <a:rPr lang="en-SG" sz="1200" b="1" dirty="0"/>
+              <a:t>{Project}.Client\bin\{Debug or Release }\net8.0\</a:t>
+            </a:r>
+            <a:r>
+              <a:rPr lang="en-SG" sz="1200" b="1" dirty="0" err="1"/>
+              <a:t>wwwroot</a:t>
+            </a:r>
+            <a:r>
+              <a:rPr lang="en-SG" sz="1200" b="1" dirty="0"/>
+              <a:t>\_framework</a:t>
+            </a:r>
+          </a:p>
+        </p:txBody>
+      </p:sp>
+      <p:pic>
+        <p:nvPicPr>
+          <p:cNvPr id="10" name="Picture 9">
+            <a:extLst>
+              <a:ext uri="{FF2B5EF4-FFF2-40B4-BE49-F238E27FC236}">
+                <a16:creationId xmlns:a16="http://schemas.microsoft.com/office/drawing/2014/main" id="{8569265C-3C51-0443-1675-284EC1D3A748}"/>
+              </a:ext>
+            </a:extLst>
+          </p:cNvPr>
+          <p:cNvPicPr>
+            <a:picLocks noChangeAspect="1"/>
+          </p:cNvPicPr>
+          <p:nvPr/>
+        </p:nvPicPr>
+        <p:blipFill>
+          <a:blip r:embed="rId2"/>
+          <a:stretch>
+            <a:fillRect/>
+          </a:stretch>
+        </p:blipFill>
+        <p:spPr>
+          <a:xfrm>
+            <a:off x="6020723" y="1699934"/>
+            <a:ext cx="2648320" cy="3991532"/>
+          </a:xfrm>
+          <a:prstGeom prst="rect">
+            <a:avLst/>
+          </a:prstGeom>
+        </p:spPr>
+      </p:pic>
+      <p:pic>
+        <p:nvPicPr>
+          <p:cNvPr id="12" name="Picture 11">
+            <a:extLst>
+              <a:ext uri="{FF2B5EF4-FFF2-40B4-BE49-F238E27FC236}">
+                <a16:creationId xmlns:a16="http://schemas.microsoft.com/office/drawing/2014/main" id="{FE2B773D-B27B-D075-420B-6FA2F53B7411}"/>
+              </a:ext>
+            </a:extLst>
+          </p:cNvPr>
+          <p:cNvPicPr>
+            <a:picLocks noChangeAspect="1"/>
+          </p:cNvPicPr>
+          <p:nvPr/>
+        </p:nvPicPr>
+        <p:blipFill>
+          <a:blip r:embed="rId3"/>
+          <a:stretch>
+            <a:fillRect/>
+          </a:stretch>
+        </p:blipFill>
+        <p:spPr>
+          <a:xfrm>
+            <a:off x="9247756" y="1626095"/>
+            <a:ext cx="2905530" cy="4505954"/>
+          </a:xfrm>
+          <a:prstGeom prst="rect">
+            <a:avLst/>
+          </a:prstGeom>
+        </p:spPr>
+      </p:pic>
+      <p:sp>
+        <p:nvSpPr>
+          <p:cNvPr id="14" name="TextBox 13">
+            <a:extLst>
+              <a:ext uri="{FF2B5EF4-FFF2-40B4-BE49-F238E27FC236}">
+                <a16:creationId xmlns:a16="http://schemas.microsoft.com/office/drawing/2014/main" id="{696D6C23-F685-6E47-6B37-EA47D158AEC7}"/>
+              </a:ext>
+            </a:extLst>
+          </p:cNvPr>
+          <p:cNvSpPr txBox="1"/>
+          <p:nvPr/>
+        </p:nvSpPr>
+        <p:spPr>
+          <a:xfrm>
+            <a:off x="6767743" y="6285937"/>
+            <a:ext cx="973584" cy="338554"/>
+          </a:xfrm>
+          <a:prstGeom prst="rect">
+            <a:avLst/>
+          </a:prstGeom>
+          <a:noFill/>
+        </p:spPr>
+        <p:txBody>
+          <a:bodyPr wrap="square">
+            <a:spAutoFit/>
+          </a:bodyPr>
+          <a:lstStyle/>
+          <a:p>
+            <a:r>
+              <a:rPr lang="en-SG" sz="1600" b="1" dirty="0" err="1">
+                <a:solidFill>
+                  <a:srgbClr val="FF0000"/>
+                </a:solidFill>
+              </a:rPr>
+              <a:t>.net</a:t>
+            </a:r>
+            <a:r>
+              <a:rPr lang="en-SG" sz="1600" b="1" dirty="0">
+                <a:solidFill>
+                  <a:srgbClr val="FF0000"/>
+                </a:solidFill>
+              </a:rPr>
+              <a:t> 6.0</a:t>
+            </a:r>
+          </a:p>
+        </p:txBody>
+      </p:sp>
+      <p:sp>
+        <p:nvSpPr>
+          <p:cNvPr id="15" name="TextBox 14">
+            <a:extLst>
+              <a:ext uri="{FF2B5EF4-FFF2-40B4-BE49-F238E27FC236}">
+                <a16:creationId xmlns:a16="http://schemas.microsoft.com/office/drawing/2014/main" id="{10D2B828-1AB9-CFE2-C0B9-249270A2A664}"/>
+              </a:ext>
+            </a:extLst>
+          </p:cNvPr>
+          <p:cNvSpPr txBox="1"/>
+          <p:nvPr/>
+        </p:nvSpPr>
+        <p:spPr>
+          <a:xfrm>
+            <a:off x="10045082" y="6285937"/>
+            <a:ext cx="973584" cy="338554"/>
+          </a:xfrm>
+          <a:prstGeom prst="rect">
+            <a:avLst/>
+          </a:prstGeom>
+          <a:noFill/>
+        </p:spPr>
+        <p:txBody>
+          <a:bodyPr wrap="square">
+            <a:spAutoFit/>
+          </a:bodyPr>
+          <a:lstStyle/>
+          <a:p>
+            <a:r>
+              <a:rPr lang="en-SG" sz="1600" b="1" dirty="0" err="1">
+                <a:solidFill>
+                  <a:srgbClr val="FF0000"/>
+                </a:solidFill>
+              </a:rPr>
+              <a:t>.net</a:t>
+            </a:r>
+            <a:r>
+              <a:rPr lang="en-SG" sz="1600" b="1" dirty="0">
+                <a:solidFill>
+                  <a:srgbClr val="FF0000"/>
+                </a:solidFill>
+              </a:rPr>
+              <a:t> 8.0</a:t>
+            </a:r>
+          </a:p>
+        </p:txBody>
+      </p:sp>
+      <p:sp>
+        <p:nvSpPr>
+          <p:cNvPr id="4" name="TextBox 3">
+            <a:extLst>
+              <a:ext uri="{FF2B5EF4-FFF2-40B4-BE49-F238E27FC236}">
+                <a16:creationId xmlns:a16="http://schemas.microsoft.com/office/drawing/2014/main" id="{44C70649-CFCC-6D73-FF84-A2B0D8126CDD}"/>
+              </a:ext>
+            </a:extLst>
+          </p:cNvPr>
+          <p:cNvSpPr txBox="1"/>
+          <p:nvPr/>
+        </p:nvSpPr>
+        <p:spPr>
+          <a:xfrm>
+            <a:off x="691078" y="2354321"/>
+            <a:ext cx="3572279" cy="369332"/>
+          </a:xfrm>
+          <a:prstGeom prst="rect">
+            <a:avLst/>
+          </a:prstGeom>
+          <a:noFill/>
+        </p:spPr>
+        <p:txBody>
+          <a:bodyPr wrap="square">
+            <a:spAutoFit/>
+          </a:bodyPr>
+          <a:lstStyle/>
+          <a:p>
+            <a:r>
+              <a:rPr lang="en-SG" i="0" dirty="0">
+                <a:solidFill>
+                  <a:srgbClr val="161616"/>
+                </a:solidFill>
+                <a:effectLst/>
+                <a:latin typeface="Segoe UI" panose="020B0502040204020203" pitchFamily="34" charset="0"/>
+              </a:rPr>
+              <a:t>Webcil packaging</a:t>
+            </a:r>
+            <a:endParaRPr lang="en-SG" dirty="0"/>
+          </a:p>
+        </p:txBody>
+      </p:sp>
+      <p:sp>
+        <p:nvSpPr>
+          <p:cNvPr id="6" name="TextBox 5">
+            <a:extLst>
+              <a:ext uri="{FF2B5EF4-FFF2-40B4-BE49-F238E27FC236}">
+                <a16:creationId xmlns:a16="http://schemas.microsoft.com/office/drawing/2014/main" id="{4887F504-FE7E-1DB8-2984-3352FC756BC3}"/>
+              </a:ext>
+            </a:extLst>
+          </p:cNvPr>
+          <p:cNvSpPr txBox="1"/>
+          <p:nvPr/>
+        </p:nvSpPr>
+        <p:spPr>
+          <a:xfrm>
+            <a:off x="569652" y="6246705"/>
+            <a:ext cx="5526348" cy="276999"/>
+          </a:xfrm>
+          <a:prstGeom prst="rect">
+            <a:avLst/>
+          </a:prstGeom>
+          <a:noFill/>
+        </p:spPr>
+        <p:txBody>
+          <a:bodyPr wrap="square">
+            <a:spAutoFit/>
+          </a:bodyPr>
+          <a:lstStyle/>
+          <a:p>
+            <a:r>
+              <a:rPr lang="en-SG" sz="1200" dirty="0">
+                <a:hlinkClick r:id="rId4"/>
+              </a:rPr>
+              <a:t>https://github.com/dotnet/runtime/blob/main/docs/design/mono/webcil.md</a:t>
+            </a:r>
+            <a:endParaRPr lang="en-SG" sz="1200" dirty="0"/>
+          </a:p>
+        </p:txBody>
+      </p:sp>
+    </p:spTree>
+    <p:extLst>
+      <p:ext uri="{BB962C8B-B14F-4D97-AF65-F5344CB8AC3E}">
+        <p14:creationId xmlns:p14="http://schemas.microsoft.com/office/powerpoint/2010/main" val="1153229066"/>
+      </p:ext>
+    </p:extLst>
+  </p:cSld>
+  <p:clrMapOvr>
+    <a:masterClrMapping/>
+  </p:clrMapOvr>
+</p:sld>
+</file>
+
+<file path=ppt/slides/slide21.xml><?xml version="1.0" encoding="utf-8"?>
+<p:sld xmlns:a="http://schemas.openxmlformats.org/drawingml/2006/main" xmlns:r="http://schemas.openxmlformats.org/officeDocument/2006/relationships" xmlns:p="http://schemas.openxmlformats.org/presentationml/2006/main">
+  <p:cSld>
+    <p:spTree>
+      <p:nvGrpSpPr>
+        <p:cNvPr id="1" name=""/>
+        <p:cNvGrpSpPr/>
+        <p:nvPr/>
+      </p:nvGrpSpPr>
+      <p:grpSpPr>
+        <a:xfrm>
+          <a:off x="0" y="0"/>
+          <a:ext cx="0" cy="0"/>
+          <a:chOff x="0" y="0"/>
+          <a:chExt cx="0" cy="0"/>
+        </a:xfrm>
+      </p:grpSpPr>
+      <p:sp>
+        <p:nvSpPr>
+          <p:cNvPr id="2" name="Title 1">
+            <a:extLst>
+              <a:ext uri="{FF2B5EF4-FFF2-40B4-BE49-F238E27FC236}">
                 <a16:creationId xmlns:a16="http://schemas.microsoft.com/office/drawing/2014/main" id="{95DF3C9F-D158-B460-32ED-CF6FE1EA30C4}"/>
               </a:ext>
             </a:extLst>
@@ -27070,7 +28456,7 @@
 </p:sld>
 </file>
 
-<file path=ppt/slides/slide21.xml><?xml version="1.0" encoding="utf-8"?>
+<file path=ppt/slides/slide22.xml><?xml version="1.0" encoding="utf-8"?>
 <p:sld xmlns:a="http://schemas.openxmlformats.org/drawingml/2006/main" xmlns:r="http://schemas.openxmlformats.org/officeDocument/2006/relationships" xmlns:p="http://schemas.openxmlformats.org/presentationml/2006/main">
   <p:cSld>
     <p:spTree>
@@ -28452,7 +29838,7 @@
 </p:sld>
 </file>
 
-<file path=ppt/slides/slide22.xml><?xml version="1.0" encoding="utf-8"?>
+<file path=ppt/slides/slide23.xml><?xml version="1.0" encoding="utf-8"?>
 <p:sld xmlns:a="http://schemas.openxmlformats.org/drawingml/2006/main" xmlns:r="http://schemas.openxmlformats.org/officeDocument/2006/relationships" xmlns:p="http://schemas.openxmlformats.org/presentationml/2006/main">
   <p:cSld>
     <p:spTree>
@@ -29794,7 +31180,7 @@
 </p:sld>
 </file>
 
-<file path=ppt/slides/slide23.xml><?xml version="1.0" encoding="utf-8"?>
+<file path=ppt/slides/slide24.xml><?xml version="1.0" encoding="utf-8"?>
 <p:sld xmlns:a="http://schemas.openxmlformats.org/drawingml/2006/main" xmlns:r="http://schemas.openxmlformats.org/officeDocument/2006/relationships" xmlns:p="http://schemas.openxmlformats.org/presentationml/2006/main">
   <p:cSld>
     <p:spTree>
@@ -30528,7 +31914,7 @@
 </p:sld>
 </file>
 
-<file path=ppt/slides/slide24.xml><?xml version="1.0" encoding="utf-8"?>
+<file path=ppt/slides/slide25.xml><?xml version="1.0" encoding="utf-8"?>
 <p:sld xmlns:a="http://schemas.openxmlformats.org/drawingml/2006/main" xmlns:r="http://schemas.openxmlformats.org/officeDocument/2006/relationships" xmlns:p="http://schemas.openxmlformats.org/presentationml/2006/main">
   <p:cSld>
     <p:spTree>

</xml_diff>